<commit_message>
Slide changes are committed.
</commit_message>
<xml_diff>
--- a/Slide/XamarinForms-Prism.pptx
+++ b/Slide/XamarinForms-Prism.pptx
@@ -5,18 +5,18 @@
     <p:sldMasterId id="2147483660" r:id="rId1"/>
   </p:sldMasterIdLst>
   <p:notesMasterIdLst>
-    <p:notesMasterId r:id="rId24"/>
+    <p:notesMasterId r:id="rId25"/>
   </p:notesMasterIdLst>
   <p:sldIdLst>
     <p:sldId id="336" r:id="rId2"/>
     <p:sldId id="1357" r:id="rId3"/>
     <p:sldId id="337" r:id="rId4"/>
-    <p:sldId id="1411" r:id="rId5"/>
-    <p:sldId id="1365" r:id="rId6"/>
-    <p:sldId id="1375" r:id="rId7"/>
-    <p:sldId id="312" r:id="rId8"/>
-    <p:sldId id="1358" r:id="rId9"/>
-    <p:sldId id="1317" r:id="rId10"/>
+    <p:sldId id="312" r:id="rId5"/>
+    <p:sldId id="1358" r:id="rId6"/>
+    <p:sldId id="1411" r:id="rId7"/>
+    <p:sldId id="1365" r:id="rId8"/>
+    <p:sldId id="1317" r:id="rId9"/>
+    <p:sldId id="1375" r:id="rId10"/>
     <p:sldId id="1412" r:id="rId11"/>
     <p:sldId id="1404" r:id="rId12"/>
     <p:sldId id="1415" r:id="rId13"/>
@@ -25,11 +25,12 @@
     <p:sldId id="1417" r:id="rId16"/>
     <p:sldId id="1418" r:id="rId17"/>
     <p:sldId id="1419" r:id="rId18"/>
-    <p:sldId id="1421" r:id="rId19"/>
-    <p:sldId id="1414" r:id="rId20"/>
-    <p:sldId id="1420" r:id="rId21"/>
-    <p:sldId id="1410" r:id="rId22"/>
-    <p:sldId id="1377" r:id="rId23"/>
+    <p:sldId id="1422" r:id="rId19"/>
+    <p:sldId id="1421" r:id="rId20"/>
+    <p:sldId id="1414" r:id="rId21"/>
+    <p:sldId id="1420" r:id="rId22"/>
+    <p:sldId id="1410" r:id="rId23"/>
+    <p:sldId id="1377" r:id="rId24"/>
   </p:sldIdLst>
   <p:sldSz cx="12192000" cy="6858000"/>
   <p:notesSz cx="6858000" cy="9144000"/>
@@ -148,12 +149,12 @@
         </p14:section>
         <p14:section name="Xamarin" id="{2D25C111-376C-4FB3-BDE2-6E98B8C70FC5}">
           <p14:sldIdLst>
+            <p14:sldId id="312"/>
+            <p14:sldId id="1358"/>
             <p14:sldId id="1411"/>
             <p14:sldId id="1365"/>
+            <p14:sldId id="1317"/>
             <p14:sldId id="1375"/>
-            <p14:sldId id="312"/>
-            <p14:sldId id="1358"/>
-            <p14:sldId id="1317"/>
           </p14:sldIdLst>
         </p14:section>
         <p14:section name="MVVM Patterns" id="{857F2E10-8B41-4C89-9A28-8C38554A062D}">
@@ -170,6 +171,7 @@
             <p14:sldId id="1417"/>
             <p14:sldId id="1418"/>
             <p14:sldId id="1419"/>
+            <p14:sldId id="1422"/>
             <p14:sldId id="1421"/>
           </p14:sldIdLst>
         </p14:section>
@@ -1139,7 +1141,7 @@
     </p:spTree>
     <p:extLst>
       <p:ext uri="{BB962C8B-B14F-4D97-AF65-F5344CB8AC3E}">
-        <p14:creationId xmlns:p14="http://schemas.microsoft.com/office/powerpoint/2010/main" val="1547300311"/>
+        <p14:creationId xmlns:p14="http://schemas.microsoft.com/office/powerpoint/2010/main" val="851338419"/>
       </p:ext>
     </p:extLst>
   </p:cSld>
@@ -1214,7 +1216,7 @@
           <a:p>
             <a:fld id="{9A022845-941E-7C42-8070-12AD873FCE1E}" type="slidenum">
               <a:rPr lang="en-US" smtClean="0"/>
-              <a:t>20</a:t>
+              <a:t>19</a:t>
             </a:fld>
             <a:endParaRPr lang="en-US" dirty="0"/>
           </a:p>
@@ -1223,7 +1225,7 @@
     </p:spTree>
     <p:extLst>
       <p:ext uri="{BB962C8B-B14F-4D97-AF65-F5344CB8AC3E}">
-        <p14:creationId xmlns:p14="http://schemas.microsoft.com/office/powerpoint/2010/main" val="1896076566"/>
+        <p14:creationId xmlns:p14="http://schemas.microsoft.com/office/powerpoint/2010/main" val="1547300311"/>
       </p:ext>
     </p:extLst>
   </p:cSld>
@@ -1277,6 +1279,90 @@
           <a:bodyPr/>
           <a:lstStyle/>
           <a:p>
+            <a:endParaRPr lang="en-US" dirty="0"/>
+          </a:p>
+        </p:txBody>
+      </p:sp>
+      <p:sp>
+        <p:nvSpPr>
+          <p:cNvPr id="4" name="Slide Number Placeholder 3"/>
+          <p:cNvSpPr>
+            <a:spLocks noGrp="1"/>
+          </p:cNvSpPr>
+          <p:nvPr>
+            <p:ph type="sldNum" sz="quarter" idx="10"/>
+          </p:nvPr>
+        </p:nvSpPr>
+        <p:spPr/>
+        <p:txBody>
+          <a:bodyPr/>
+          <a:lstStyle/>
+          <a:p>
+            <a:fld id="{9A022845-941E-7C42-8070-12AD873FCE1E}" type="slidenum">
+              <a:rPr lang="en-US" smtClean="0"/>
+              <a:t>21</a:t>
+            </a:fld>
+            <a:endParaRPr lang="en-US" dirty="0"/>
+          </a:p>
+        </p:txBody>
+      </p:sp>
+    </p:spTree>
+    <p:extLst>
+      <p:ext uri="{BB962C8B-B14F-4D97-AF65-F5344CB8AC3E}">
+        <p14:creationId xmlns:p14="http://schemas.microsoft.com/office/powerpoint/2010/main" val="1896076566"/>
+      </p:ext>
+    </p:extLst>
+  </p:cSld>
+  <p:clrMapOvr>
+    <a:masterClrMapping/>
+  </p:clrMapOvr>
+</p:notes>
+</file>
+
+<file path=ppt/notesSlides/notesSlide18.xml><?xml version="1.0" encoding="utf-8"?>
+<p:notes xmlns:a="http://schemas.openxmlformats.org/drawingml/2006/main" xmlns:r="http://schemas.openxmlformats.org/officeDocument/2006/relationships" xmlns:p="http://schemas.openxmlformats.org/presentationml/2006/main">
+  <p:cSld>
+    <p:spTree>
+      <p:nvGrpSpPr>
+        <p:cNvPr id="1" name=""/>
+        <p:cNvGrpSpPr/>
+        <p:nvPr/>
+      </p:nvGrpSpPr>
+      <p:grpSpPr>
+        <a:xfrm>
+          <a:off x="0" y="0"/>
+          <a:ext cx="0" cy="0"/>
+          <a:chOff x="0" y="0"/>
+          <a:chExt cx="0" cy="0"/>
+        </a:xfrm>
+      </p:grpSpPr>
+      <p:sp>
+        <p:nvSpPr>
+          <p:cNvPr id="2" name="Slide Image Placeholder 1"/>
+          <p:cNvSpPr>
+            <a:spLocks noGrp="1" noRot="1" noChangeAspect="1"/>
+          </p:cNvSpPr>
+          <p:nvPr>
+            <p:ph type="sldImg"/>
+          </p:nvPr>
+        </p:nvSpPr>
+        <p:spPr/>
+      </p:sp>
+      <p:sp>
+        <p:nvSpPr>
+          <p:cNvPr id="3" name="Notes Placeholder 2"/>
+          <p:cNvSpPr>
+            <a:spLocks noGrp="1"/>
+          </p:cNvSpPr>
+          <p:nvPr>
+            <p:ph type="body" idx="1"/>
+          </p:nvPr>
+        </p:nvSpPr>
+        <p:spPr/>
+        <p:txBody>
+          <a:bodyPr/>
+          <a:lstStyle/>
+          <a:p>
             <a:pPr marL="0" marR="0" lvl="0" indent="0" algn="l" defTabSz="932742" rtl="0" eaLnBrk="1" fontAlgn="auto" latinLnBrk="0" hangingPunct="1">
               <a:lnSpc>
                 <a:spcPct val="90000"/>
@@ -1396,7 +1482,7 @@
             <a:fld id="{B4008EB6-D09E-4580-8CD6-DDB14511944F}" type="slidenum">
               <a:rPr lang="en-US" smtClean="0"/>
               <a:pPr/>
-              <a:t>22</a:t>
+              <a:t>23</a:t>
             </a:fld>
             <a:endParaRPr lang="en-US" dirty="0"/>
           </a:p>
@@ -1712,90 +1798,6 @@
             <p:ph type="sldImg"/>
           </p:nvPr>
         </p:nvSpPr>
-        <p:spPr/>
-      </p:sp>
-      <p:sp>
-        <p:nvSpPr>
-          <p:cNvPr id="3" name="Notes Placeholder 2"/>
-          <p:cNvSpPr>
-            <a:spLocks noGrp="1"/>
-          </p:cNvSpPr>
-          <p:nvPr>
-            <p:ph type="body" idx="1"/>
-          </p:nvPr>
-        </p:nvSpPr>
-        <p:spPr/>
-        <p:txBody>
-          <a:bodyPr/>
-          <a:lstStyle/>
-          <a:p>
-            <a:endParaRPr lang="en-US" dirty="0"/>
-          </a:p>
-        </p:txBody>
-      </p:sp>
-      <p:sp>
-        <p:nvSpPr>
-          <p:cNvPr id="4" name="Slide Number Placeholder 3"/>
-          <p:cNvSpPr>
-            <a:spLocks noGrp="1"/>
-          </p:cNvSpPr>
-          <p:nvPr>
-            <p:ph type="sldNum" sz="quarter" idx="5"/>
-          </p:nvPr>
-        </p:nvSpPr>
-        <p:spPr/>
-        <p:txBody>
-          <a:bodyPr/>
-          <a:lstStyle/>
-          <a:p>
-            <a:fld id="{65097B6B-FF96-F443-AED4-FFB28983C4F8}" type="slidenum">
-              <a:rPr lang="en-US" smtClean="0"/>
-              <a:t>6</a:t>
-            </a:fld>
-            <a:endParaRPr lang="en-US" dirty="0"/>
-          </a:p>
-        </p:txBody>
-      </p:sp>
-    </p:spTree>
-    <p:extLst>
-      <p:ext uri="{BB962C8B-B14F-4D97-AF65-F5344CB8AC3E}">
-        <p14:creationId xmlns:p14="http://schemas.microsoft.com/office/powerpoint/2010/main" val="3464886844"/>
-      </p:ext>
-    </p:extLst>
-  </p:cSld>
-  <p:clrMapOvr>
-    <a:masterClrMapping/>
-  </p:clrMapOvr>
-</p:notes>
-</file>
-
-<file path=ppt/notesSlides/notesSlide5.xml><?xml version="1.0" encoding="utf-8"?>
-<p:notes xmlns:a="http://schemas.openxmlformats.org/drawingml/2006/main" xmlns:r="http://schemas.openxmlformats.org/officeDocument/2006/relationships" xmlns:p="http://schemas.openxmlformats.org/presentationml/2006/main">
-  <p:cSld>
-    <p:spTree>
-      <p:nvGrpSpPr>
-        <p:cNvPr id="1" name=""/>
-        <p:cNvGrpSpPr/>
-        <p:nvPr/>
-      </p:nvGrpSpPr>
-      <p:grpSpPr>
-        <a:xfrm>
-          <a:off x="0" y="0"/>
-          <a:ext cx="0" cy="0"/>
-          <a:chOff x="0" y="0"/>
-          <a:chExt cx="0" cy="0"/>
-        </a:xfrm>
-      </p:grpSpPr>
-      <p:sp>
-        <p:nvSpPr>
-          <p:cNvPr id="2" name="Slide Image Placeholder 1"/>
-          <p:cNvSpPr>
-            <a:spLocks noGrp="1" noRot="1" noChangeAspect="1"/>
-          </p:cNvSpPr>
-          <p:nvPr>
-            <p:ph type="sldImg"/>
-          </p:nvPr>
-        </p:nvSpPr>
         <p:spPr>
           <a:xfrm>
             <a:off x="381000" y="685800"/>
@@ -2048,7 +2050,7 @@
                 <a:tabLst/>
                 <a:defRPr/>
               </a:pPr>
-              <a:t>7</a:t>
+              <a:t>4</a:t>
             </a:fld>
             <a:endParaRPr kumimoji="0" lang="en-US" sz="1800" b="0" i="0" u="none" strike="noStrike" kern="0" cap="none" spc="0" normalizeH="0" baseline="0" noProof="0" dirty="0">
               <a:ln>
@@ -2068,6 +2070,171 @@
     <p:extLst>
       <p:ext uri="{BB962C8B-B14F-4D97-AF65-F5344CB8AC3E}">
         <p14:creationId xmlns:p14="http://schemas.microsoft.com/office/powerpoint/2010/main" val="3533170868"/>
+      </p:ext>
+    </p:extLst>
+  </p:cSld>
+  <p:clrMapOvr>
+    <a:masterClrMapping/>
+  </p:clrMapOvr>
+</p:notes>
+</file>
+
+<file path=ppt/notesSlides/notesSlide5.xml><?xml version="1.0" encoding="utf-8"?>
+<p:notes xmlns:a="http://schemas.openxmlformats.org/drawingml/2006/main" xmlns:r="http://schemas.openxmlformats.org/officeDocument/2006/relationships" xmlns:p="http://schemas.openxmlformats.org/presentationml/2006/main">
+  <p:cSld>
+    <p:spTree>
+      <p:nvGrpSpPr>
+        <p:cNvPr id="1" name=""/>
+        <p:cNvGrpSpPr/>
+        <p:nvPr/>
+      </p:nvGrpSpPr>
+      <p:grpSpPr>
+        <a:xfrm>
+          <a:off x="0" y="0"/>
+          <a:ext cx="0" cy="0"/>
+          <a:chOff x="0" y="0"/>
+          <a:chExt cx="0" cy="0"/>
+        </a:xfrm>
+      </p:grpSpPr>
+      <p:sp>
+        <p:nvSpPr>
+          <p:cNvPr id="2" name="Slide Image Placeholder 1"/>
+          <p:cNvSpPr>
+            <a:spLocks noGrp="1" noRot="1" noChangeAspect="1"/>
+          </p:cNvSpPr>
+          <p:nvPr>
+            <p:ph type="sldImg"/>
+          </p:nvPr>
+        </p:nvSpPr>
+        <p:spPr/>
+      </p:sp>
+      <p:sp>
+        <p:nvSpPr>
+          <p:cNvPr id="3" name="Notes Placeholder 2"/>
+          <p:cNvSpPr>
+            <a:spLocks noGrp="1"/>
+          </p:cNvSpPr>
+          <p:nvPr>
+            <p:ph type="body" idx="1"/>
+          </p:nvPr>
+        </p:nvSpPr>
+        <p:spPr/>
+        <p:txBody>
+          <a:bodyPr/>
+          <a:lstStyle/>
+          <a:p>
+            <a:endParaRPr lang="en-US" dirty="0"/>
+          </a:p>
+        </p:txBody>
+      </p:sp>
+      <p:sp>
+        <p:nvSpPr>
+          <p:cNvPr id="4" name="Header Placeholder 3"/>
+          <p:cNvSpPr>
+            <a:spLocks noGrp="1"/>
+          </p:cNvSpPr>
+          <p:nvPr>
+            <p:ph type="hdr" sz="quarter" idx="10"/>
+          </p:nvPr>
+        </p:nvSpPr>
+        <p:spPr/>
+        <p:txBody>
+          <a:bodyPr/>
+          <a:lstStyle/>
+          <a:p>
+            <a:endParaRPr lang="en-US" dirty="0"/>
+          </a:p>
+        </p:txBody>
+      </p:sp>
+      <p:sp>
+        <p:nvSpPr>
+          <p:cNvPr id="5" name="Footer Placeholder 4"/>
+          <p:cNvSpPr>
+            <a:spLocks noGrp="1"/>
+          </p:cNvSpPr>
+          <p:nvPr>
+            <p:ph type="ftr" sz="quarter" idx="11"/>
+          </p:nvPr>
+        </p:nvSpPr>
+        <p:spPr/>
+        <p:txBody>
+          <a:bodyPr/>
+          <a:lstStyle/>
+          <a:p>
+            <a:pPr marL="398463" defTabSz="914099" eaLnBrk="0" hangingPunct="0"/>
+            <a:r>
+              <a:rPr lang="en-US" sz="400" dirty="0">
+                <a:gradFill>
+                  <a:gsLst>
+                    <a:gs pos="0">
+                      <a:schemeClr val="tx1"/>
+                    </a:gs>
+                    <a:gs pos="100000">
+                      <a:schemeClr val="tx1"/>
+                    </a:gs>
+                  </a:gsLst>
+                  <a:lin ang="5400000" scaled="0"/>
+                </a:gradFill>
+                <a:latin typeface="Segoe UI" pitchFamily="34" charset="0"/>
+                <a:ea typeface="Segoe UI" pitchFamily="34" charset="0"/>
+                <a:cs typeface="Segoe UI" pitchFamily="34" charset="0"/>
+              </a:rPr>
+              <a:t>© Microsoft Corporation. All rights reserved. </a:t>
+            </a:r>
+          </a:p>
+        </p:txBody>
+      </p:sp>
+      <p:sp>
+        <p:nvSpPr>
+          <p:cNvPr id="6" name="Date Placeholder 5"/>
+          <p:cNvSpPr>
+            <a:spLocks noGrp="1"/>
+          </p:cNvSpPr>
+          <p:nvPr>
+            <p:ph type="dt" idx="12"/>
+          </p:nvPr>
+        </p:nvSpPr>
+        <p:spPr/>
+        <p:txBody>
+          <a:bodyPr/>
+          <a:lstStyle/>
+          <a:p>
+            <a:fld id="{61B0BD91-A332-4638-9D55-E1550E13BA63}" type="datetime8">
+              <a:rPr lang="en-US" smtClean="0"/>
+              <a:t>12/28/2019 3:04 AM</a:t>
+            </a:fld>
+            <a:endParaRPr lang="en-US" dirty="0"/>
+          </a:p>
+        </p:txBody>
+      </p:sp>
+      <p:sp>
+        <p:nvSpPr>
+          <p:cNvPr id="7" name="Slide Number Placeholder 6"/>
+          <p:cNvSpPr>
+            <a:spLocks noGrp="1"/>
+          </p:cNvSpPr>
+          <p:nvPr>
+            <p:ph type="sldNum" sz="quarter" idx="13"/>
+          </p:nvPr>
+        </p:nvSpPr>
+        <p:spPr/>
+        <p:txBody>
+          <a:bodyPr/>
+          <a:lstStyle/>
+          <a:p>
+            <a:fld id="{B4008EB6-D09E-4580-8CD6-DDB14511944F}" type="slidenum">
+              <a:rPr lang="en-US" smtClean="0"/>
+              <a:pPr/>
+              <a:t>5</a:t>
+            </a:fld>
+            <a:endParaRPr lang="en-US" dirty="0"/>
+          </a:p>
+        </p:txBody>
+      </p:sp>
+    </p:spTree>
+    <p:extLst>
+      <p:ext uri="{BB962C8B-B14F-4D97-AF65-F5344CB8AC3E}">
+        <p14:creationId xmlns:p14="http://schemas.microsoft.com/office/powerpoint/2010/main" val="932137105"/>
       </p:ext>
     </p:extLst>
   </p:cSld>
@@ -2127,12 +2294,12 @@
       </p:sp>
       <p:sp>
         <p:nvSpPr>
-          <p:cNvPr id="4" name="Header Placeholder 3"/>
+          <p:cNvPr id="4" name="Slide Number Placeholder 3"/>
           <p:cNvSpPr>
             <a:spLocks noGrp="1"/>
           </p:cNvSpPr>
           <p:nvPr>
-            <p:ph type="hdr" sz="quarter" idx="10"/>
+            <p:ph type="sldNum" sz="quarter" idx="10"/>
           </p:nvPr>
         </p:nvSpPr>
         <p:spPr/>
@@ -2140,89 +2307,8 @@
           <a:bodyPr/>
           <a:lstStyle/>
           <a:p>
-            <a:endParaRPr lang="en-US" dirty="0"/>
-          </a:p>
-        </p:txBody>
-      </p:sp>
-      <p:sp>
-        <p:nvSpPr>
-          <p:cNvPr id="5" name="Footer Placeholder 4"/>
-          <p:cNvSpPr>
-            <a:spLocks noGrp="1"/>
-          </p:cNvSpPr>
-          <p:nvPr>
-            <p:ph type="ftr" sz="quarter" idx="11"/>
-          </p:nvPr>
-        </p:nvSpPr>
-        <p:spPr/>
-        <p:txBody>
-          <a:bodyPr/>
-          <a:lstStyle/>
-          <a:p>
-            <a:pPr marL="398463" defTabSz="914099" eaLnBrk="0" hangingPunct="0"/>
-            <a:r>
-              <a:rPr lang="en-US" sz="400" dirty="0">
-                <a:gradFill>
-                  <a:gsLst>
-                    <a:gs pos="0">
-                      <a:schemeClr val="tx1"/>
-                    </a:gs>
-                    <a:gs pos="100000">
-                      <a:schemeClr val="tx1"/>
-                    </a:gs>
-                  </a:gsLst>
-                  <a:lin ang="5400000" scaled="0"/>
-                </a:gradFill>
-                <a:latin typeface="Segoe UI" pitchFamily="34" charset="0"/>
-                <a:ea typeface="Segoe UI" pitchFamily="34" charset="0"/>
-                <a:cs typeface="Segoe UI" pitchFamily="34" charset="0"/>
-              </a:rPr>
-              <a:t>© Microsoft Corporation. All rights reserved. </a:t>
-            </a:r>
-          </a:p>
-        </p:txBody>
-      </p:sp>
-      <p:sp>
-        <p:nvSpPr>
-          <p:cNvPr id="6" name="Date Placeholder 5"/>
-          <p:cNvSpPr>
-            <a:spLocks noGrp="1"/>
-          </p:cNvSpPr>
-          <p:nvPr>
-            <p:ph type="dt" idx="12"/>
-          </p:nvPr>
-        </p:nvSpPr>
-        <p:spPr/>
-        <p:txBody>
-          <a:bodyPr/>
-          <a:lstStyle/>
-          <a:p>
-            <a:fld id="{61B0BD91-A332-4638-9D55-E1550E13BA63}" type="datetime8">
+            <a:fld id="{9A022845-941E-7C42-8070-12AD873FCE1E}" type="slidenum">
               <a:rPr lang="en-US" smtClean="0"/>
-              <a:t>12/28/2019 3:04 AM</a:t>
-            </a:fld>
-            <a:endParaRPr lang="en-US" dirty="0"/>
-          </a:p>
-        </p:txBody>
-      </p:sp>
-      <p:sp>
-        <p:nvSpPr>
-          <p:cNvPr id="7" name="Slide Number Placeholder 6"/>
-          <p:cNvSpPr>
-            <a:spLocks noGrp="1"/>
-          </p:cNvSpPr>
-          <p:nvPr>
-            <p:ph type="sldNum" sz="quarter" idx="13"/>
-          </p:nvPr>
-        </p:nvSpPr>
-        <p:spPr/>
-        <p:txBody>
-          <a:bodyPr/>
-          <a:lstStyle/>
-          <a:p>
-            <a:fld id="{B4008EB6-D09E-4580-8CD6-DDB14511944F}" type="slidenum">
-              <a:rPr lang="en-US" smtClean="0"/>
-              <a:pPr/>
               <a:t>8</a:t>
             </a:fld>
             <a:endParaRPr lang="en-US" dirty="0"/>
@@ -2232,7 +2318,7 @@
     </p:spTree>
     <p:extLst>
       <p:ext uri="{BB962C8B-B14F-4D97-AF65-F5344CB8AC3E}">
-        <p14:creationId xmlns:p14="http://schemas.microsoft.com/office/powerpoint/2010/main" val="932137105"/>
+        <p14:creationId xmlns:p14="http://schemas.microsoft.com/office/powerpoint/2010/main" val="1697536986"/>
       </p:ext>
     </p:extLst>
   </p:cSld>
@@ -2297,7 +2383,7 @@
             <a:spLocks noGrp="1"/>
           </p:cNvSpPr>
           <p:nvPr>
-            <p:ph type="sldNum" sz="quarter" idx="10"/>
+            <p:ph type="sldNum" sz="quarter" idx="5"/>
           </p:nvPr>
         </p:nvSpPr>
         <p:spPr/>
@@ -2305,7 +2391,7 @@
           <a:bodyPr/>
           <a:lstStyle/>
           <a:p>
-            <a:fld id="{9A022845-941E-7C42-8070-12AD873FCE1E}" type="slidenum">
+            <a:fld id="{65097B6B-FF96-F443-AED4-FFB28983C4F8}" type="slidenum">
               <a:rPr lang="en-US" smtClean="0"/>
               <a:t>9</a:t>
             </a:fld>
@@ -2316,7 +2402,7 @@
     </p:spTree>
     <p:extLst>
       <p:ext uri="{BB962C8B-B14F-4D97-AF65-F5344CB8AC3E}">
-        <p14:creationId xmlns:p14="http://schemas.microsoft.com/office/powerpoint/2010/main" val="1697536986"/>
+        <p14:creationId xmlns:p14="http://schemas.microsoft.com/office/powerpoint/2010/main" val="3464886844"/>
       </p:ext>
     </p:extLst>
   </p:cSld>
@@ -13157,6 +13243,75 @@
       </p:grpSpPr>
       <p:sp>
         <p:nvSpPr>
+          <p:cNvPr id="8" name="Rectangle 7">
+            <a:extLst>
+              <a:ext uri="{FF2B5EF4-FFF2-40B4-BE49-F238E27FC236}">
+                <a16:creationId xmlns:a16="http://schemas.microsoft.com/office/drawing/2014/main" id="{EF3D9517-6FE1-40E7-9ACD-F3508C88F7DA}"/>
+              </a:ext>
+            </a:extLst>
+          </p:cNvPr>
+          <p:cNvSpPr/>
+          <p:nvPr/>
+        </p:nvSpPr>
+        <p:spPr bwMode="auto">
+          <a:xfrm>
+            <a:off x="3284657" y="1189176"/>
+            <a:ext cx="8165221" cy="5379313"/>
+          </a:xfrm>
+          <a:prstGeom prst="rect">
+            <a:avLst/>
+          </a:prstGeom>
+          <a:solidFill>
+            <a:schemeClr val="tx1">
+              <a:lumMod val="75000"/>
+            </a:schemeClr>
+          </a:solidFill>
+          <a:ln>
+            <a:noFill/>
+            <a:headEnd type="none" w="med" len="med"/>
+            <a:tailEnd type="none" w="med" len="med"/>
+          </a:ln>
+          <a:effectLst/>
+        </p:spPr>
+        <p:style>
+          <a:lnRef idx="1">
+            <a:schemeClr val="accent2"/>
+          </a:lnRef>
+          <a:fillRef idx="3">
+            <a:schemeClr val="accent2"/>
+          </a:fillRef>
+          <a:effectRef idx="2">
+            <a:schemeClr val="accent2"/>
+          </a:effectRef>
+          <a:fontRef idx="minor">
+            <a:schemeClr val="lt1"/>
+          </a:fontRef>
+        </p:style>
+        <p:txBody>
+          <a:bodyPr lIns="91440" tIns="91440" rIns="34294" bIns="34294" rtlCol="0" anchor="b" anchorCtr="0"/>
+          <a:lstStyle/>
+          <a:p>
+            <a:pPr algn="ctr" defTabSz="932406"/>
+            <a:endParaRPr lang="en-IN" sz="800" dirty="0">
+              <a:gradFill>
+                <a:gsLst>
+                  <a:gs pos="0">
+                    <a:srgbClr val="FFFFFF"/>
+                  </a:gs>
+                  <a:gs pos="100000">
+                    <a:srgbClr val="FFFFFF"/>
+                  </a:gs>
+                </a:gsLst>
+                <a:lin ang="5400000" scaled="0"/>
+              </a:gradFill>
+              <a:ea typeface="Segoe UI" pitchFamily="34" charset="0"/>
+              <a:cs typeface="Segoe UI" pitchFamily="34" charset="0"/>
+            </a:endParaRPr>
+          </a:p>
+        </p:txBody>
+      </p:sp>
+      <p:sp>
+        <p:nvSpPr>
           <p:cNvPr id="9" name="Title 8"/>
           <p:cNvSpPr>
             <a:spLocks noGrp="1"/>
@@ -13176,8 +13331,21 @@
                   <a:schemeClr val="bg1"/>
                 </a:solidFill>
               </a:rPr>
-              <a:t>Prism – What else it offers?</a:t>
+              <a:t>Prism – </a:t>
             </a:r>
+            <a:r>
+              <a:rPr lang="en-US" sz="4800" dirty="0">
+                <a:solidFill>
+                  <a:schemeClr val="bg1"/>
+                </a:solidFill>
+              </a:rPr>
+              <a:t>Platform Services</a:t>
+            </a:r>
+            <a:endParaRPr lang="en-US" dirty="0">
+              <a:solidFill>
+                <a:schemeClr val="bg1"/>
+              </a:solidFill>
+            </a:endParaRPr>
           </a:p>
         </p:txBody>
       </p:sp>
@@ -13192,7 +13360,7 @@
         <p:spPr>
           <a:xfrm>
             <a:off x="2934111" y="1441329"/>
-            <a:ext cx="8458413" cy="5132111"/>
+            <a:ext cx="8990969" cy="5132111"/>
           </a:xfrm>
           <a:prstGeom prst="rect">
             <a:avLst/>
@@ -13437,12 +13605,735 @@
             </a:lvl9pPr>
           </a:lstStyle>
           <a:p>
+            <a:pPr marL="558800" lvl="2" indent="0">
+              <a:buNone/>
+            </a:pPr>
+            <a:r>
+              <a:rPr lang="en-US" sz="1400" dirty="0">
+                <a:solidFill>
+                  <a:schemeClr val="bg1"/>
+                </a:solidFill>
+                <a:latin typeface="+mj-lt"/>
+              </a:rPr>
+              <a:t>public partial class AppDelegate : FormsApplicationDelegate, IPlatformInitializer</a:t>
+            </a:r>
+          </a:p>
+          <a:p>
+            <a:pPr marL="558800" lvl="2" indent="0">
+              <a:buNone/>
+            </a:pPr>
+            <a:r>
+              <a:rPr lang="en-IN" sz="1400" dirty="0">
+                <a:solidFill>
+                  <a:schemeClr val="bg1"/>
+                </a:solidFill>
+                <a:latin typeface="+mj-lt"/>
+              </a:rPr>
+              <a:t>{</a:t>
+            </a:r>
+          </a:p>
+          <a:p>
+            <a:pPr marL="558800" lvl="2" indent="0">
+              <a:buNone/>
+            </a:pPr>
+            <a:r>
+              <a:rPr lang="en-US" sz="1400" dirty="0">
+                <a:solidFill>
+                  <a:schemeClr val="bg1"/>
+                </a:solidFill>
+                <a:latin typeface="+mj-lt"/>
+              </a:rPr>
+              <a:t>    public override bool FinishedLaunching(UIApplication app, NSDictionary options)</a:t>
+            </a:r>
+          </a:p>
+          <a:p>
+            <a:pPr marL="558800" lvl="2" indent="0">
+              <a:buNone/>
+            </a:pPr>
+            <a:r>
+              <a:rPr lang="en-IN" sz="1400" dirty="0">
+                <a:solidFill>
+                  <a:schemeClr val="bg1"/>
+                </a:solidFill>
+                <a:latin typeface="+mj-lt"/>
+              </a:rPr>
+              <a:t>    {</a:t>
+            </a:r>
+          </a:p>
+          <a:p>
+            <a:pPr marL="558800" lvl="2" indent="0">
+              <a:buNone/>
+            </a:pPr>
+            <a:r>
+              <a:rPr lang="en-IN" sz="1400" dirty="0">
+                <a:solidFill>
+                  <a:schemeClr val="bg1"/>
+                </a:solidFill>
+                <a:latin typeface="+mj-lt"/>
+              </a:rPr>
+              <a:t>        global::Xamarin.Forms.Forms.Init();</a:t>
+            </a:r>
+          </a:p>
+          <a:p>
+            <a:pPr marL="558800" lvl="2" indent="0">
+              <a:buNone/>
+            </a:pPr>
+            <a:r>
+              <a:rPr lang="en-IN" sz="1400" dirty="0">
+                <a:solidFill>
+                  <a:schemeClr val="bg1"/>
+                </a:solidFill>
+                <a:latin typeface="+mj-lt"/>
+              </a:rPr>
+              <a:t>        LoadApplication(new App(this));</a:t>
+            </a:r>
+          </a:p>
+          <a:p>
+            <a:pPr marL="558800" lvl="2" indent="0">
+              <a:buNone/>
+            </a:pPr>
+            <a:r>
+              <a:rPr lang="en-US" sz="1400" dirty="0">
+                <a:solidFill>
+                  <a:schemeClr val="bg1"/>
+                </a:solidFill>
+                <a:latin typeface="+mj-lt"/>
+              </a:rPr>
+              <a:t>        return base.FinishedLaunching(app, options);</a:t>
+            </a:r>
+          </a:p>
+          <a:p>
+            <a:pPr marL="558800" lvl="2" indent="0">
+              <a:buNone/>
+            </a:pPr>
+            <a:r>
+              <a:rPr lang="en-IN" sz="1400" dirty="0">
+                <a:solidFill>
+                  <a:schemeClr val="bg1"/>
+                </a:solidFill>
+                <a:latin typeface="+mj-lt"/>
+              </a:rPr>
+              <a:t>    }</a:t>
+            </a:r>
+          </a:p>
+          <a:p>
+            <a:pPr marL="558800" lvl="2" indent="0">
+              <a:buNone/>
+            </a:pPr>
+            <a:endParaRPr lang="en-IN" sz="1400" dirty="0">
+              <a:solidFill>
+                <a:schemeClr val="bg1"/>
+              </a:solidFill>
+              <a:latin typeface="+mj-lt"/>
+            </a:endParaRPr>
+          </a:p>
+          <a:p>
+            <a:pPr marL="558800" lvl="2" indent="0">
+              <a:buNone/>
+            </a:pPr>
+            <a:r>
+              <a:rPr lang="en-US" sz="1400" dirty="0">
+                <a:solidFill>
+                  <a:schemeClr val="bg1"/>
+                </a:solidFill>
+                <a:latin typeface="+mj-lt"/>
+              </a:rPr>
+              <a:t>    public void RegisterTypes(IContainerRegistry containerRegistry)</a:t>
+            </a:r>
+          </a:p>
+          <a:p>
+            <a:pPr marL="558800" lvl="2" indent="0">
+              <a:buNone/>
+            </a:pPr>
+            <a:r>
+              <a:rPr lang="en-IN" sz="1400" dirty="0">
+                <a:solidFill>
+                  <a:schemeClr val="bg1"/>
+                </a:solidFill>
+                <a:latin typeface="+mj-lt"/>
+              </a:rPr>
+              <a:t>    {</a:t>
+            </a:r>
+          </a:p>
+          <a:p>
+            <a:pPr marL="558800" lvl="2" indent="0">
+              <a:buNone/>
+            </a:pPr>
+            <a:r>
+              <a:rPr lang="en-IN" sz="1400" dirty="0">
+                <a:solidFill>
+                  <a:schemeClr val="bg1"/>
+                </a:solidFill>
+                <a:latin typeface="+mj-lt"/>
+              </a:rPr>
+              <a:t>        </a:t>
+            </a:r>
+            <a:r>
+              <a:rPr lang="en-IN" sz="1400" dirty="0" err="1">
+                <a:solidFill>
+                  <a:schemeClr val="bg1"/>
+                </a:solidFill>
+                <a:latin typeface="+mj-lt"/>
+              </a:rPr>
+              <a:t>containerRegistry.Register</a:t>
+            </a:r>
+            <a:r>
+              <a:rPr lang="en-IN" sz="1400" dirty="0">
+                <a:solidFill>
+                  <a:schemeClr val="bg1"/>
+                </a:solidFill>
+                <a:latin typeface="+mj-lt"/>
+              </a:rPr>
+              <a:t>&lt;</a:t>
+            </a:r>
+            <a:r>
+              <a:rPr lang="en-IN" sz="1400" dirty="0" err="1">
+                <a:solidFill>
+                  <a:schemeClr val="bg1"/>
+                </a:solidFill>
+                <a:latin typeface="+mj-lt"/>
+              </a:rPr>
+              <a:t>ITextToSpeech</a:t>
+            </a:r>
+            <a:r>
+              <a:rPr lang="en-IN" sz="1400" dirty="0">
+                <a:solidFill>
+                  <a:schemeClr val="bg1"/>
+                </a:solidFill>
+                <a:latin typeface="+mj-lt"/>
+              </a:rPr>
+              <a:t>, </a:t>
+            </a:r>
+            <a:r>
+              <a:rPr lang="en-IN" sz="1400" dirty="0" err="1">
+                <a:solidFill>
+                  <a:schemeClr val="bg1"/>
+                </a:solidFill>
+                <a:latin typeface="+mj-lt"/>
+              </a:rPr>
+              <a:t>TextToSpeech</a:t>
+            </a:r>
+            <a:r>
+              <a:rPr lang="en-IN" sz="1400" dirty="0">
+                <a:solidFill>
+                  <a:schemeClr val="bg1"/>
+                </a:solidFill>
+                <a:latin typeface="+mj-lt"/>
+              </a:rPr>
+              <a:t>&gt;();</a:t>
+            </a:r>
+          </a:p>
+          <a:p>
+            <a:pPr marL="558800" lvl="2" indent="0">
+              <a:buNone/>
+            </a:pPr>
+            <a:r>
+              <a:rPr lang="en-IN" sz="1400" dirty="0">
+                <a:solidFill>
+                  <a:schemeClr val="bg1"/>
+                </a:solidFill>
+                <a:latin typeface="+mj-lt"/>
+              </a:rPr>
+              <a:t>    }</a:t>
+            </a:r>
+          </a:p>
+          <a:p>
+            <a:pPr marL="558800" lvl="2" indent="0">
+              <a:buNone/>
+            </a:pPr>
+            <a:r>
+              <a:rPr lang="en-IN" sz="1400" dirty="0">
+                <a:solidFill>
+                  <a:schemeClr val="bg1"/>
+                </a:solidFill>
+                <a:latin typeface="+mj-lt"/>
+              </a:rPr>
+              <a:t>}</a:t>
+            </a:r>
+          </a:p>
+          <a:p>
+            <a:pPr marL="558800" lvl="2" indent="0">
+              <a:buNone/>
+            </a:pPr>
+            <a:endParaRPr lang="en-IN" sz="1400" dirty="0">
+              <a:solidFill>
+                <a:schemeClr val="bg1"/>
+              </a:solidFill>
+              <a:latin typeface="+mj-lt"/>
+            </a:endParaRPr>
+          </a:p>
+          <a:p>
+            <a:pPr marL="558800" lvl="2" indent="0">
+              <a:buNone/>
+            </a:pPr>
+            <a:r>
+              <a:rPr lang="en-IN" sz="1400" dirty="0">
+                <a:solidFill>
+                  <a:schemeClr val="bg1"/>
+                </a:solidFill>
+                <a:latin typeface="+mj-lt"/>
+              </a:rPr>
+              <a:t>public class App : PrismApplication</a:t>
+            </a:r>
+          </a:p>
+          <a:p>
+            <a:pPr marL="558800" lvl="2" indent="0">
+              <a:buNone/>
+            </a:pPr>
+            <a:r>
+              <a:rPr lang="en-IN" sz="1400" dirty="0">
+                <a:solidFill>
+                  <a:schemeClr val="bg1"/>
+                </a:solidFill>
+                <a:latin typeface="+mj-lt"/>
+              </a:rPr>
+              <a:t>{</a:t>
+            </a:r>
+          </a:p>
+          <a:p>
+            <a:pPr marL="558800" lvl="2" indent="0">
+              <a:buNone/>
+            </a:pPr>
+            <a:r>
+              <a:rPr lang="en-IN" sz="1400" dirty="0">
+                <a:solidFill>
+                  <a:schemeClr val="bg1"/>
+                </a:solidFill>
+                <a:latin typeface="+mj-lt"/>
+              </a:rPr>
+              <a:t>    public App(IPlatformInitializer initializer) : base(initializer)</a:t>
+            </a:r>
+          </a:p>
+          <a:p>
+            <a:pPr marL="558800" lvl="2" indent="0">
+              <a:buNone/>
+            </a:pPr>
+            <a:r>
+              <a:rPr lang="en-IN" sz="1400" dirty="0">
+                <a:solidFill>
+                  <a:schemeClr val="bg1"/>
+                </a:solidFill>
+                <a:latin typeface="+mj-lt"/>
+              </a:rPr>
+              <a:t>    {</a:t>
+            </a:r>
+          </a:p>
+          <a:p>
+            <a:pPr marL="558800" lvl="2" indent="0">
+              <a:buNone/>
+            </a:pPr>
+            <a:r>
+              <a:rPr lang="en-IN" sz="1400" dirty="0">
+                <a:solidFill>
+                  <a:schemeClr val="bg1"/>
+                </a:solidFill>
+                <a:latin typeface="+mj-lt"/>
+              </a:rPr>
+              <a:t>    }</a:t>
+            </a:r>
+          </a:p>
+          <a:p>
+            <a:pPr marL="558800" lvl="2" indent="0">
+              <a:buNone/>
+            </a:pPr>
+            <a:r>
+              <a:rPr lang="en-IN" sz="1400" dirty="0">
+                <a:solidFill>
+                  <a:schemeClr val="bg1"/>
+                </a:solidFill>
+                <a:latin typeface="+mj-lt"/>
+              </a:rPr>
+              <a:t>}</a:t>
+            </a:r>
+            <a:endParaRPr lang="en-US" sz="1400" dirty="0">
+              <a:solidFill>
+                <a:schemeClr val="bg1"/>
+              </a:solidFill>
+              <a:latin typeface="+mj-lt"/>
+            </a:endParaRPr>
+          </a:p>
+        </p:txBody>
+      </p:sp>
+      <p:pic>
+        <p:nvPicPr>
+          <p:cNvPr id="5" name="Picture 4" descr="Prism Library">
+            <a:extLst>
+              <a:ext uri="{FF2B5EF4-FFF2-40B4-BE49-F238E27FC236}">
+                <a16:creationId xmlns:a16="http://schemas.microsoft.com/office/drawing/2014/main" id="{31887925-7827-4454-B998-A717EB3AEF9F}"/>
+              </a:ext>
+            </a:extLst>
+          </p:cNvPr>
+          <p:cNvPicPr>
+            <a:picLocks noChangeAspect="1" noChangeArrowheads="1"/>
+          </p:cNvPicPr>
+          <p:nvPr/>
+        </p:nvPicPr>
+        <p:blipFill>
+          <a:blip r:embed="rId3">
+            <a:extLst>
+              <a:ext uri="{28A0092B-C50C-407E-A947-70E740481C1C}">
+                <a14:useLocalDpi xmlns:a14="http://schemas.microsoft.com/office/drawing/2010/main" val="0"/>
+              </a:ext>
+            </a:extLst>
+          </a:blip>
+          <a:srcRect/>
+          <a:stretch>
+            <a:fillRect/>
+          </a:stretch>
+        </p:blipFill>
+        <p:spPr bwMode="auto">
+          <a:xfrm>
+            <a:off x="416802" y="2444103"/>
+            <a:ext cx="2171700" cy="2171700"/>
+          </a:xfrm>
+          <a:prstGeom prst="rect">
+            <a:avLst/>
+          </a:prstGeom>
+          <a:noFill/>
+          <a:extLst>
+            <a:ext uri="{909E8E84-426E-40DD-AFC4-6F175D3DCCD1}">
+              <a14:hiddenFill xmlns:a14="http://schemas.microsoft.com/office/drawing/2010/main">
+                <a:solidFill>
+                  <a:srgbClr val="FFFFFF"/>
+                </a:solidFill>
+              </a14:hiddenFill>
+            </a:ext>
+          </a:extLst>
+        </p:spPr>
+      </p:pic>
+    </p:spTree>
+    <p:extLst>
+      <p:ext uri="{BB962C8B-B14F-4D97-AF65-F5344CB8AC3E}">
+        <p14:creationId xmlns:p14="http://schemas.microsoft.com/office/powerpoint/2010/main" val="3838376332"/>
+      </p:ext>
+    </p:extLst>
+  </p:cSld>
+  <p:clrMapOvr>
+    <a:masterClrMapping/>
+  </p:clrMapOvr>
+  <mc:AlternateContent xmlns:mc="http://schemas.openxmlformats.org/markup-compatibility/2006" xmlns:p14="http://schemas.microsoft.com/office/powerpoint/2010/main">
+    <mc:Choice Requires="p14">
+      <p:transition spd="med" p14:dur="700">
+        <p:fade/>
+      </p:transition>
+    </mc:Choice>
+    <mc:Fallback xmlns="">
+      <p:transition spd="med">
+        <p:fade/>
+      </p:transition>
+    </mc:Fallback>
+  </mc:AlternateContent>
+</p:sld>
+</file>
+
+<file path=ppt/slides/slide19.xml><?xml version="1.0" encoding="utf-8"?>
+<p:sld xmlns:a="http://schemas.openxmlformats.org/drawingml/2006/main" xmlns:r="http://schemas.openxmlformats.org/officeDocument/2006/relationships" xmlns:p="http://schemas.openxmlformats.org/presentationml/2006/main">
+  <p:cSld>
+    <p:spTree>
+      <p:nvGrpSpPr>
+        <p:cNvPr id="1" name=""/>
+        <p:cNvGrpSpPr/>
+        <p:nvPr/>
+      </p:nvGrpSpPr>
+      <p:grpSpPr>
+        <a:xfrm>
+          <a:off x="0" y="0"/>
+          <a:ext cx="0" cy="0"/>
+          <a:chOff x="0" y="0"/>
+          <a:chExt cx="0" cy="0"/>
+        </a:xfrm>
+      </p:grpSpPr>
+      <p:sp>
+        <p:nvSpPr>
+          <p:cNvPr id="9" name="Title 8"/>
+          <p:cNvSpPr>
+            <a:spLocks noGrp="1"/>
+          </p:cNvSpPr>
+          <p:nvPr>
+            <p:ph type="title"/>
+          </p:nvPr>
+        </p:nvSpPr>
+        <p:spPr/>
+        <p:txBody>
+          <a:bodyPr/>
+          <a:lstStyle/>
+          <a:p>
+            <a:r>
+              <a:rPr lang="en-US" dirty="0">
+                <a:solidFill>
+                  <a:schemeClr val="bg1"/>
+                </a:solidFill>
+              </a:rPr>
+              <a:t>Prism – What else it offers?</a:t>
+            </a:r>
+          </a:p>
+        </p:txBody>
+      </p:sp>
+      <p:sp>
+        <p:nvSpPr>
+          <p:cNvPr id="10" name="Text Placeholder 18"/>
+          <p:cNvSpPr txBox="1">
+            <a:spLocks/>
+          </p:cNvSpPr>
+          <p:nvPr/>
+        </p:nvSpPr>
+        <p:spPr>
+          <a:xfrm>
+            <a:off x="2934111" y="1441328"/>
+            <a:ext cx="8458413" cy="4614914"/>
+          </a:xfrm>
+          <a:prstGeom prst="rect">
+            <a:avLst/>
+          </a:prstGeom>
+        </p:spPr>
+        <p:txBody>
+          <a:bodyPr vert="horz" wrap="square" lIns="143407" tIns="89630" rIns="143407" bIns="89630" rtlCol="0">
+            <a:noAutofit/>
+          </a:bodyPr>
+          <a:lstStyle>
+            <a:lvl1pPr marL="342900" marR="0" indent="-342900" algn="l" defTabSz="932742" rtl="0" eaLnBrk="1" fontAlgn="auto" latinLnBrk="0" hangingPunct="1">
+              <a:lnSpc>
+                <a:spcPct val="90000"/>
+              </a:lnSpc>
+              <a:spcBef>
+                <a:spcPct val="20000"/>
+              </a:spcBef>
+              <a:spcAft>
+                <a:spcPts val="0"/>
+              </a:spcAft>
+              <a:buClrTx/>
+              <a:buSzPct val="90000"/>
+              <a:buFont typeface="Arial" pitchFamily="34" charset="0"/>
+              <a:buNone/>
+              <a:tabLst/>
+              <a:defRPr kumimoji="0" lang="en-US" sz="2400" b="0" i="0" u="none" strike="noStrike" kern="1200" cap="none" spc="0" normalizeH="0" baseline="0" dirty="0" smtClean="0">
+                <a:ln>
+                  <a:noFill/>
+                </a:ln>
+                <a:gradFill>
+                  <a:gsLst>
+                    <a:gs pos="100000">
+                      <a:srgbClr val="000000">
+                        <a:lumMod val="75000"/>
+                        <a:lumOff val="25000"/>
+                      </a:srgbClr>
+                    </a:gs>
+                    <a:gs pos="0">
+                      <a:srgbClr val="000000">
+                        <a:lumMod val="75000"/>
+                        <a:lumOff val="25000"/>
+                      </a:srgbClr>
+                    </a:gs>
+                  </a:gsLst>
+                  <a:lin ang="5400000" scaled="0"/>
+                </a:gradFill>
+                <a:effectLst/>
+                <a:uLnTx/>
+                <a:uFillTx/>
+                <a:latin typeface="+mn-lt"/>
+                <a:ea typeface="+mj-ea"/>
+                <a:cs typeface="+mj-cs"/>
+              </a:defRPr>
+            </a:lvl1pPr>
+            <a:lvl2pPr marL="584200" marR="0" indent="-241300" algn="l" defTabSz="932742" rtl="0" eaLnBrk="1" fontAlgn="auto" latinLnBrk="0" hangingPunct="1">
+              <a:lnSpc>
+                <a:spcPct val="90000"/>
+              </a:lnSpc>
+              <a:spcBef>
+                <a:spcPct val="20000"/>
+              </a:spcBef>
+              <a:spcAft>
+                <a:spcPts val="0"/>
+              </a:spcAft>
+              <a:buClrTx/>
+              <a:buSzPct val="90000"/>
+              <a:buFont typeface="Arial" pitchFamily="34" charset="0"/>
+              <a:buChar char="•"/>
+              <a:tabLst/>
+              <a:defRPr sz="2400" kern="1200" spc="0" baseline="0">
+                <a:gradFill>
+                  <a:gsLst>
+                    <a:gs pos="1250">
+                      <a:schemeClr val="tx1"/>
+                    </a:gs>
+                    <a:gs pos="100000">
+                      <a:schemeClr val="tx1"/>
+                    </a:gs>
+                  </a:gsLst>
+                  <a:lin ang="5400000" scaled="0"/>
+                </a:gradFill>
+                <a:latin typeface="+mn-lt"/>
+                <a:ea typeface="+mn-ea"/>
+                <a:cs typeface="+mn-cs"/>
+              </a:defRPr>
+            </a:lvl2pPr>
+            <a:lvl3pPr marL="800100" marR="0" indent="-228600" algn="l" defTabSz="932742" rtl="0" eaLnBrk="1" fontAlgn="auto" latinLnBrk="0" hangingPunct="1">
+              <a:lnSpc>
+                <a:spcPct val="90000"/>
+              </a:lnSpc>
+              <a:spcBef>
+                <a:spcPct val="20000"/>
+              </a:spcBef>
+              <a:spcAft>
+                <a:spcPts val="0"/>
+              </a:spcAft>
+              <a:buClrTx/>
+              <a:buSzPct val="90000"/>
+              <a:buFont typeface="Arial" pitchFamily="34" charset="0"/>
+              <a:buChar char="•"/>
+              <a:tabLst/>
+              <a:defRPr sz="2000" kern="1200" spc="0" baseline="0">
+                <a:gradFill>
+                  <a:gsLst>
+                    <a:gs pos="1250">
+                      <a:schemeClr val="tx1"/>
+                    </a:gs>
+                    <a:gs pos="100000">
+                      <a:schemeClr val="tx1"/>
+                    </a:gs>
+                  </a:gsLst>
+                  <a:lin ang="5400000" scaled="0"/>
+                </a:gradFill>
+                <a:latin typeface="+mn-lt"/>
+                <a:ea typeface="+mn-ea"/>
+                <a:cs typeface="+mn-cs"/>
+              </a:defRPr>
+            </a:lvl3pPr>
+            <a:lvl4pPr marL="1028700" marR="0" indent="-228600" algn="l" defTabSz="932742" rtl="0" eaLnBrk="1" fontAlgn="auto" latinLnBrk="0" hangingPunct="1">
+              <a:lnSpc>
+                <a:spcPct val="90000"/>
+              </a:lnSpc>
+              <a:spcBef>
+                <a:spcPct val="20000"/>
+              </a:spcBef>
+              <a:spcAft>
+                <a:spcPts val="0"/>
+              </a:spcAft>
+              <a:buClrTx/>
+              <a:buSzPct val="90000"/>
+              <a:buFont typeface="Arial" pitchFamily="34" charset="0"/>
+              <a:buChar char="•"/>
+              <a:tabLst/>
+              <a:defRPr sz="1800" kern="1200" spc="0" baseline="0">
+                <a:gradFill>
+                  <a:gsLst>
+                    <a:gs pos="1250">
+                      <a:schemeClr val="tx1"/>
+                    </a:gs>
+                    <a:gs pos="100000">
+                      <a:schemeClr val="tx1"/>
+                    </a:gs>
+                  </a:gsLst>
+                  <a:lin ang="5400000" scaled="0"/>
+                </a:gradFill>
+                <a:latin typeface="+mn-lt"/>
+                <a:ea typeface="+mn-ea"/>
+                <a:cs typeface="+mn-cs"/>
+              </a:defRPr>
+            </a:lvl4pPr>
+            <a:lvl5pPr marL="1257300" marR="0" indent="-228600" algn="l" defTabSz="932742" rtl="0" eaLnBrk="1" fontAlgn="auto" latinLnBrk="0" hangingPunct="1">
+              <a:lnSpc>
+                <a:spcPct val="90000"/>
+              </a:lnSpc>
+              <a:spcBef>
+                <a:spcPct val="20000"/>
+              </a:spcBef>
+              <a:spcAft>
+                <a:spcPts val="0"/>
+              </a:spcAft>
+              <a:buClrTx/>
+              <a:buSzPct val="90000"/>
+              <a:buFont typeface="Arial" pitchFamily="34" charset="0"/>
+              <a:buChar char="•"/>
+              <a:tabLst/>
+              <a:defRPr sz="1800" kern="1200" spc="0" baseline="0">
+                <a:gradFill>
+                  <a:gsLst>
+                    <a:gs pos="1250">
+                      <a:schemeClr val="tx1"/>
+                    </a:gs>
+                    <a:gs pos="100000">
+                      <a:schemeClr val="tx1"/>
+                    </a:gs>
+                  </a:gsLst>
+                  <a:lin ang="5400000" scaled="0"/>
+                </a:gradFill>
+                <a:latin typeface="+mn-lt"/>
+                <a:ea typeface="+mn-ea"/>
+                <a:cs typeface="+mn-cs"/>
+              </a:defRPr>
+            </a:lvl5pPr>
+            <a:lvl6pPr marL="2565040" indent="-233186" algn="l" defTabSz="932742" rtl="0" eaLnBrk="1" latinLnBrk="0" hangingPunct="1">
+              <a:spcBef>
+                <a:spcPct val="20000"/>
+              </a:spcBef>
+              <a:buFont typeface="Arial" pitchFamily="34" charset="0"/>
+              <a:buChar char="•"/>
+              <a:defRPr sz="2000" kern="1200">
+                <a:solidFill>
+                  <a:schemeClr val="tx1"/>
+                </a:solidFill>
+                <a:latin typeface="+mn-lt"/>
+                <a:ea typeface="+mn-ea"/>
+                <a:cs typeface="+mn-cs"/>
+              </a:defRPr>
+            </a:lvl6pPr>
+            <a:lvl7pPr marL="3031412" indent="-233186" algn="l" defTabSz="932742" rtl="0" eaLnBrk="1" latinLnBrk="0" hangingPunct="1">
+              <a:spcBef>
+                <a:spcPct val="20000"/>
+              </a:spcBef>
+              <a:buFont typeface="Arial" pitchFamily="34" charset="0"/>
+              <a:buChar char="•"/>
+              <a:defRPr sz="2000" kern="1200">
+                <a:solidFill>
+                  <a:schemeClr val="tx1"/>
+                </a:solidFill>
+                <a:latin typeface="+mn-lt"/>
+                <a:ea typeface="+mn-ea"/>
+                <a:cs typeface="+mn-cs"/>
+              </a:defRPr>
+            </a:lvl7pPr>
+            <a:lvl8pPr marL="3497783" indent="-233186" algn="l" defTabSz="932742" rtl="0" eaLnBrk="1" latinLnBrk="0" hangingPunct="1">
+              <a:spcBef>
+                <a:spcPct val="20000"/>
+              </a:spcBef>
+              <a:buFont typeface="Arial" pitchFamily="34" charset="0"/>
+              <a:buChar char="•"/>
+              <a:defRPr sz="2000" kern="1200">
+                <a:solidFill>
+                  <a:schemeClr val="tx1"/>
+                </a:solidFill>
+                <a:latin typeface="+mn-lt"/>
+                <a:ea typeface="+mn-ea"/>
+                <a:cs typeface="+mn-cs"/>
+              </a:defRPr>
+            </a:lvl8pPr>
+            <a:lvl9pPr marL="3964155" indent="-233186" algn="l" defTabSz="932742" rtl="0" eaLnBrk="1" latinLnBrk="0" hangingPunct="1">
+              <a:spcBef>
+                <a:spcPct val="20000"/>
+              </a:spcBef>
+              <a:buFont typeface="Arial" pitchFamily="34" charset="0"/>
+              <a:buChar char="•"/>
+              <a:defRPr sz="2000" kern="1200">
+                <a:solidFill>
+                  <a:schemeClr val="tx1"/>
+                </a:solidFill>
+                <a:latin typeface="+mn-lt"/>
+                <a:ea typeface="+mn-ea"/>
+                <a:cs typeface="+mn-cs"/>
+              </a:defRPr>
+            </a:lvl9pPr>
+          </a:lstStyle>
+          <a:p>
             <a:pPr marL="457200" indent="-457200">
+              <a:lnSpc>
+                <a:spcPct val="100000"/>
+              </a:lnSpc>
               <a:buFont typeface="Wingdings" panose="05000000000000000000" pitchFamily="2" charset="2"/>
               <a:buChar char="ü"/>
             </a:pPr>
             <a:r>
-              <a:rPr lang="en-US" sz="3200" dirty="0">
+              <a:rPr lang="en-US" sz="3600" dirty="0">
                 <a:solidFill>
                   <a:schemeClr val="bg1"/>
                 </a:solidFill>
@@ -13453,11 +14344,14 @@
           </a:p>
           <a:p>
             <a:pPr marL="457200" indent="-457200">
+              <a:lnSpc>
+                <a:spcPct val="100000"/>
+              </a:lnSpc>
               <a:buFont typeface="Wingdings" panose="05000000000000000000" pitchFamily="2" charset="2"/>
               <a:buChar char="ü"/>
             </a:pPr>
             <a:r>
-              <a:rPr lang="en-US" sz="3200" dirty="0">
+              <a:rPr lang="en-US" sz="3600" dirty="0">
                 <a:solidFill>
                   <a:schemeClr val="bg1"/>
                 </a:solidFill>
@@ -13468,11 +14362,14 @@
           </a:p>
           <a:p>
             <a:pPr marL="457200" indent="-457200">
+              <a:lnSpc>
+                <a:spcPct val="100000"/>
+              </a:lnSpc>
               <a:buFont typeface="Wingdings" panose="05000000000000000000" pitchFamily="2" charset="2"/>
               <a:buChar char="ü"/>
             </a:pPr>
             <a:r>
-              <a:rPr lang="en-US" sz="3200" dirty="0">
+              <a:rPr lang="en-US" sz="3600" dirty="0">
                 <a:solidFill>
                   <a:schemeClr val="bg1"/>
                 </a:solidFill>
@@ -13483,11 +14380,14 @@
           </a:p>
           <a:p>
             <a:pPr marL="457200" indent="-457200">
+              <a:lnSpc>
+                <a:spcPct val="100000"/>
+              </a:lnSpc>
               <a:buFont typeface="Wingdings" panose="05000000000000000000" pitchFamily="2" charset="2"/>
               <a:buChar char="ü"/>
             </a:pPr>
             <a:r>
-              <a:rPr lang="en-US" sz="3200" dirty="0">
+              <a:rPr lang="en-US" sz="3600" dirty="0">
                 <a:solidFill>
                   <a:schemeClr val="bg1"/>
                 </a:solidFill>
@@ -13498,11 +14398,14 @@
           </a:p>
           <a:p>
             <a:pPr marL="457200" indent="-457200">
+              <a:lnSpc>
+                <a:spcPct val="100000"/>
+              </a:lnSpc>
               <a:buFont typeface="Wingdings" panose="05000000000000000000" pitchFamily="2" charset="2"/>
               <a:buChar char="ü"/>
             </a:pPr>
             <a:r>
-              <a:rPr lang="en-US" sz="3200" dirty="0">
+              <a:rPr lang="en-US" sz="3600" dirty="0">
                 <a:solidFill>
                   <a:schemeClr val="bg1"/>
                 </a:solidFill>
@@ -13513,41 +14416,38 @@
           </a:p>
           <a:p>
             <a:pPr marL="457200" indent="-457200">
+              <a:lnSpc>
+                <a:spcPct val="100000"/>
+              </a:lnSpc>
               <a:buFont typeface="Wingdings" panose="05000000000000000000" pitchFamily="2" charset="2"/>
               <a:buChar char="ü"/>
             </a:pPr>
             <a:r>
-              <a:rPr lang="en-US" sz="3200" dirty="0">
+              <a:rPr lang="en-US" sz="3600" dirty="0" err="1">
                 <a:solidFill>
                   <a:schemeClr val="bg1"/>
                 </a:solidFill>
                 <a:latin typeface="+mj-lt"/>
               </a:rPr>
-              <a:t>Platform Services</a:t>
+              <a:t>IDestructible</a:t>
             </a:r>
+            <a:endParaRPr lang="en-US" sz="3600" dirty="0">
+              <a:solidFill>
+                <a:schemeClr val="bg1"/>
+              </a:solidFill>
+              <a:latin typeface="+mj-lt"/>
+            </a:endParaRPr>
           </a:p>
           <a:p>
             <a:pPr marL="457200" indent="-457200">
+              <a:lnSpc>
+                <a:spcPct val="100000"/>
+              </a:lnSpc>
               <a:buFont typeface="Wingdings" panose="05000000000000000000" pitchFamily="2" charset="2"/>
               <a:buChar char="ü"/>
             </a:pPr>
             <a:r>
-              <a:rPr lang="en-US" sz="3200" dirty="0">
-                <a:solidFill>
-                  <a:schemeClr val="bg1"/>
-                </a:solidFill>
-                <a:latin typeface="+mj-lt"/>
-              </a:rPr>
-              <a:t>IDestructible</a:t>
-            </a:r>
-          </a:p>
-          <a:p>
-            <a:pPr marL="457200" indent="-457200">
-              <a:buFont typeface="Wingdings" panose="05000000000000000000" pitchFamily="2" charset="2"/>
-              <a:buChar char="ü"/>
-            </a:pPr>
-            <a:r>
-              <a:rPr lang="en-US" sz="3200" dirty="0">
+              <a:rPr lang="en-US" sz="3600" dirty="0">
                 <a:solidFill>
                   <a:schemeClr val="bg1"/>
                 </a:solidFill>
@@ -14062,67 +14962,6 @@
                       </p:childTnLst>
                     </p:cTn>
                   </p:par>
-                  <p:par>
-                    <p:cTn id="38" fill="hold">
-                      <p:stCondLst>
-                        <p:cond delay="indefinite"/>
-                      </p:stCondLst>
-                      <p:childTnLst>
-                        <p:par>
-                          <p:cTn id="39" fill="hold">
-                            <p:stCondLst>
-                              <p:cond delay="0"/>
-                            </p:stCondLst>
-                            <p:childTnLst>
-                              <p:par>
-                                <p:cTn id="40" presetID="10" presetClass="entr" presetSubtype="0" fill="hold" grpId="0" nodeType="clickEffect">
-                                  <p:stCondLst>
-                                    <p:cond delay="0"/>
-                                  </p:stCondLst>
-                                  <p:childTnLst>
-                                    <p:set>
-                                      <p:cBhvr>
-                                        <p:cTn id="41" dur="1" fill="hold">
-                                          <p:stCondLst>
-                                            <p:cond delay="0"/>
-                                          </p:stCondLst>
-                                        </p:cTn>
-                                        <p:tgtEl>
-                                          <p:spTgt spid="10">
-                                            <p:txEl>
-                                              <p:pRg st="7" end="7"/>
-                                            </p:txEl>
-                                          </p:spTgt>
-                                        </p:tgtEl>
-                                        <p:attrNameLst>
-                                          <p:attrName>style.visibility</p:attrName>
-                                        </p:attrNameLst>
-                                      </p:cBhvr>
-                                      <p:to>
-                                        <p:strVal val="visible"/>
-                                      </p:to>
-                                    </p:set>
-                                    <p:animEffect transition="in" filter="fade">
-                                      <p:cBhvr>
-                                        <p:cTn id="42" dur="500"/>
-                                        <p:tgtEl>
-                                          <p:spTgt spid="10">
-                                            <p:txEl>
-                                              <p:pRg st="7" end="7"/>
-                                            </p:txEl>
-                                          </p:spTgt>
-                                        </p:tgtEl>
-                                      </p:cBhvr>
-                                    </p:animEffect>
-                                  </p:childTnLst>
-                                </p:cTn>
-                              </p:par>
-                            </p:childTnLst>
-                          </p:cTn>
-                        </p:par>
-                      </p:childTnLst>
-                    </p:cTn>
-                  </p:par>
                 </p:childTnLst>
               </p:cTn>
               <p:prevCondLst>
@@ -14148,140 +14987,6 @@
       <p:bldP spid="10" grpId="0" uiExpand="1" build="p"/>
     </p:bldLst>
   </p:timing>
-</p:sld>
-</file>
-
-<file path=ppt/slides/slide19.xml><?xml version="1.0" encoding="utf-8"?>
-<p:sld xmlns:a="http://schemas.openxmlformats.org/drawingml/2006/main" xmlns:r="http://schemas.openxmlformats.org/officeDocument/2006/relationships" xmlns:p="http://schemas.openxmlformats.org/presentationml/2006/main">
-  <p:cSld>
-    <p:spTree>
-      <p:nvGrpSpPr>
-        <p:cNvPr id="1" name=""/>
-        <p:cNvGrpSpPr/>
-        <p:nvPr/>
-      </p:nvGrpSpPr>
-      <p:grpSpPr>
-        <a:xfrm>
-          <a:off x="0" y="0"/>
-          <a:ext cx="0" cy="0"/>
-          <a:chOff x="0" y="0"/>
-          <a:chExt cx="0" cy="0"/>
-        </a:xfrm>
-      </p:grpSpPr>
-      <p:sp>
-        <p:nvSpPr>
-          <p:cNvPr id="3" name="Title 2">
-            <a:extLst>
-              <a:ext uri="{FF2B5EF4-FFF2-40B4-BE49-F238E27FC236}">
-                <a16:creationId xmlns:a16="http://schemas.microsoft.com/office/drawing/2014/main" id="{3016675F-28DC-40D7-87BD-E91C0745B7E8}"/>
-              </a:ext>
-            </a:extLst>
-          </p:cNvPr>
-          <p:cNvSpPr>
-            <a:spLocks noGrp="1"/>
-          </p:cNvSpPr>
-          <p:nvPr>
-            <p:ph type="title"/>
-          </p:nvPr>
-        </p:nvSpPr>
-        <p:spPr>
-          <a:xfrm>
-            <a:off x="3502622" y="3014235"/>
-            <a:ext cx="7311151" cy="1031429"/>
-          </a:xfrm>
-        </p:spPr>
-        <p:txBody>
-          <a:bodyPr/>
-          <a:lstStyle/>
-          <a:p>
-            <a:pPr defTabSz="932742"/>
-            <a:r>
-              <a:rPr lang="en-US" sz="4600" b="1" spc="-102" dirty="0">
-                <a:solidFill>
-                  <a:schemeClr val="bg1"/>
-                </a:solidFill>
-                <a:latin typeface="+mn-lt"/>
-              </a:rPr>
-              <a:t>Let's code an Application</a:t>
-            </a:r>
-            <a:endParaRPr lang="en-IN" sz="4600" b="1" spc="-102" dirty="0">
-              <a:solidFill>
-                <a:schemeClr val="bg1"/>
-              </a:solidFill>
-              <a:latin typeface="+mn-lt"/>
-            </a:endParaRPr>
-          </a:p>
-        </p:txBody>
-      </p:sp>
-      <p:pic>
-        <p:nvPicPr>
-          <p:cNvPr id="4" name="Picture 3" descr="Prism Library">
-            <a:extLst>
-              <a:ext uri="{FF2B5EF4-FFF2-40B4-BE49-F238E27FC236}">
-                <a16:creationId xmlns:a16="http://schemas.microsoft.com/office/drawing/2014/main" id="{0DF83EE5-970A-43E5-B3C0-40DA246D81A3}"/>
-              </a:ext>
-            </a:extLst>
-          </p:cNvPr>
-          <p:cNvPicPr>
-            <a:picLocks noChangeAspect="1" noChangeArrowheads="1"/>
-          </p:cNvPicPr>
-          <p:nvPr/>
-        </p:nvPicPr>
-        <p:blipFill>
-          <a:blip r:embed="rId2">
-            <a:extLst>
-              <a:ext uri="{28A0092B-C50C-407E-A947-70E740481C1C}">
-                <a14:useLocalDpi xmlns:a14="http://schemas.microsoft.com/office/drawing/2010/main" val="0"/>
-              </a:ext>
-            </a:extLst>
-          </a:blip>
-          <a:srcRect/>
-          <a:stretch>
-            <a:fillRect/>
-          </a:stretch>
-        </p:blipFill>
-        <p:spPr bwMode="auto">
-          <a:xfrm>
-            <a:off x="416802" y="2444101"/>
-            <a:ext cx="2171700" cy="2171700"/>
-          </a:xfrm>
-          <a:prstGeom prst="rect">
-            <a:avLst/>
-          </a:prstGeom>
-          <a:noFill/>
-          <a:extLst>
-            <a:ext uri="{909E8E84-426E-40DD-AFC4-6F175D3DCCD1}">
-              <a14:hiddenFill xmlns:a14="http://schemas.microsoft.com/office/drawing/2010/main">
-                <a:solidFill>
-                  <a:srgbClr val="FFFFFF"/>
-                </a:solidFill>
-              </a14:hiddenFill>
-            </a:ext>
-          </a:extLst>
-        </p:spPr>
-      </p:pic>
-    </p:spTree>
-    <p:extLst>
-      <p:ext uri="{BB962C8B-B14F-4D97-AF65-F5344CB8AC3E}">
-        <p14:creationId xmlns:p14="http://schemas.microsoft.com/office/powerpoint/2010/main" val="1043674661"/>
-      </p:ext>
-    </p:extLst>
-  </p:cSld>
-  <p:clrMapOvr>
-    <a:masterClrMapping/>
-  </p:clrMapOvr>
-  <mc:AlternateContent xmlns:mc="http://schemas.openxmlformats.org/markup-compatibility/2006" xmlns:p14="http://schemas.microsoft.com/office/powerpoint/2010/main">
-    <mc:Choice Requires="p14">
-      <p:transition spd="slow">
-        <p14:reveal/>
-      </p:transition>
-    </mc:Choice>
-    <mc:Fallback xmlns="">
-      <p:transition spd="slow">
-        <p:fade/>
-      </p:transition>
-    </mc:Fallback>
-  </mc:AlternateContent>
 </p:sld>
 </file>
 
@@ -15859,6 +16564,140 @@
       </p:grpSpPr>
       <p:sp>
         <p:nvSpPr>
+          <p:cNvPr id="3" name="Title 2">
+            <a:extLst>
+              <a:ext uri="{FF2B5EF4-FFF2-40B4-BE49-F238E27FC236}">
+                <a16:creationId xmlns:a16="http://schemas.microsoft.com/office/drawing/2014/main" id="{3016675F-28DC-40D7-87BD-E91C0745B7E8}"/>
+              </a:ext>
+            </a:extLst>
+          </p:cNvPr>
+          <p:cNvSpPr>
+            <a:spLocks noGrp="1"/>
+          </p:cNvSpPr>
+          <p:nvPr>
+            <p:ph type="title"/>
+          </p:nvPr>
+        </p:nvSpPr>
+        <p:spPr>
+          <a:xfrm>
+            <a:off x="3502622" y="3014235"/>
+            <a:ext cx="7311151" cy="1031429"/>
+          </a:xfrm>
+        </p:spPr>
+        <p:txBody>
+          <a:bodyPr/>
+          <a:lstStyle/>
+          <a:p>
+            <a:pPr defTabSz="932742"/>
+            <a:r>
+              <a:rPr lang="en-US" sz="4600" b="1" spc="-102" dirty="0">
+                <a:solidFill>
+                  <a:schemeClr val="bg1"/>
+                </a:solidFill>
+                <a:latin typeface="+mn-lt"/>
+              </a:rPr>
+              <a:t>Let's code an Application</a:t>
+            </a:r>
+            <a:endParaRPr lang="en-IN" sz="4600" b="1" spc="-102" dirty="0">
+              <a:solidFill>
+                <a:schemeClr val="bg1"/>
+              </a:solidFill>
+              <a:latin typeface="+mn-lt"/>
+            </a:endParaRPr>
+          </a:p>
+        </p:txBody>
+      </p:sp>
+      <p:pic>
+        <p:nvPicPr>
+          <p:cNvPr id="4" name="Picture 3" descr="Prism Library">
+            <a:extLst>
+              <a:ext uri="{FF2B5EF4-FFF2-40B4-BE49-F238E27FC236}">
+                <a16:creationId xmlns:a16="http://schemas.microsoft.com/office/drawing/2014/main" id="{0DF83EE5-970A-43E5-B3C0-40DA246D81A3}"/>
+              </a:ext>
+            </a:extLst>
+          </p:cNvPr>
+          <p:cNvPicPr>
+            <a:picLocks noChangeAspect="1" noChangeArrowheads="1"/>
+          </p:cNvPicPr>
+          <p:nvPr/>
+        </p:nvPicPr>
+        <p:blipFill>
+          <a:blip r:embed="rId2">
+            <a:extLst>
+              <a:ext uri="{28A0092B-C50C-407E-A947-70E740481C1C}">
+                <a14:useLocalDpi xmlns:a14="http://schemas.microsoft.com/office/drawing/2010/main" val="0"/>
+              </a:ext>
+            </a:extLst>
+          </a:blip>
+          <a:srcRect/>
+          <a:stretch>
+            <a:fillRect/>
+          </a:stretch>
+        </p:blipFill>
+        <p:spPr bwMode="auto">
+          <a:xfrm>
+            <a:off x="416802" y="2444101"/>
+            <a:ext cx="2171700" cy="2171700"/>
+          </a:xfrm>
+          <a:prstGeom prst="rect">
+            <a:avLst/>
+          </a:prstGeom>
+          <a:noFill/>
+          <a:extLst>
+            <a:ext uri="{909E8E84-426E-40DD-AFC4-6F175D3DCCD1}">
+              <a14:hiddenFill xmlns:a14="http://schemas.microsoft.com/office/drawing/2010/main">
+                <a:solidFill>
+                  <a:srgbClr val="FFFFFF"/>
+                </a:solidFill>
+              </a14:hiddenFill>
+            </a:ext>
+          </a:extLst>
+        </p:spPr>
+      </p:pic>
+    </p:spTree>
+    <p:extLst>
+      <p:ext uri="{BB962C8B-B14F-4D97-AF65-F5344CB8AC3E}">
+        <p14:creationId xmlns:p14="http://schemas.microsoft.com/office/powerpoint/2010/main" val="1043674661"/>
+      </p:ext>
+    </p:extLst>
+  </p:cSld>
+  <p:clrMapOvr>
+    <a:masterClrMapping/>
+  </p:clrMapOvr>
+  <mc:AlternateContent xmlns:mc="http://schemas.openxmlformats.org/markup-compatibility/2006" xmlns:p14="http://schemas.microsoft.com/office/powerpoint/2010/main">
+    <mc:Choice Requires="p14">
+      <p:transition spd="slow">
+        <p14:reveal/>
+      </p:transition>
+    </mc:Choice>
+    <mc:Fallback xmlns="">
+      <p:transition spd="slow">
+        <p:fade/>
+      </p:transition>
+    </mc:Fallback>
+  </mc:AlternateContent>
+</p:sld>
+</file>
+
+<file path=ppt/slides/slide21.xml><?xml version="1.0" encoding="utf-8"?>
+<p:sld xmlns:a="http://schemas.openxmlformats.org/drawingml/2006/main" xmlns:r="http://schemas.openxmlformats.org/officeDocument/2006/relationships" xmlns:p="http://schemas.openxmlformats.org/presentationml/2006/main">
+  <p:cSld>
+    <p:spTree>
+      <p:nvGrpSpPr>
+        <p:cNvPr id="1" name=""/>
+        <p:cNvGrpSpPr/>
+        <p:nvPr/>
+      </p:nvGrpSpPr>
+      <p:grpSpPr>
+        <a:xfrm>
+          <a:off x="0" y="0"/>
+          <a:ext cx="0" cy="0"/>
+          <a:chOff x="0" y="0"/>
+          <a:chExt cx="0" cy="0"/>
+        </a:xfrm>
+      </p:grpSpPr>
+      <p:sp>
+        <p:nvSpPr>
           <p:cNvPr id="9" name="Title 8"/>
           <p:cNvSpPr>
             <a:spLocks noGrp="1"/>
@@ -16929,7 +17768,7 @@
 </p:sld>
 </file>
 
-<file path=ppt/slides/slide21.xml><?xml version="1.0" encoding="utf-8"?>
+<file path=ppt/slides/slide22.xml><?xml version="1.0" encoding="utf-8"?>
 <p:sld xmlns:a="http://schemas.openxmlformats.org/drawingml/2006/main" xmlns:r="http://schemas.openxmlformats.org/officeDocument/2006/relationships" xmlns:p="http://schemas.openxmlformats.org/presentationml/2006/main">
   <p:cSld>
     <p:spTree>
@@ -17189,7 +18028,7 @@
 </p:sld>
 </file>
 
-<file path=ppt/slides/slide22.xml><?xml version="1.0" encoding="utf-8"?>
+<file path=ppt/slides/slide23.xml><?xml version="1.0" encoding="utf-8"?>
 <p:sld xmlns:a="http://schemas.openxmlformats.org/drawingml/2006/main" xmlns:r="http://schemas.openxmlformats.org/officeDocument/2006/relationships" xmlns:p="http://schemas.openxmlformats.org/presentationml/2006/main">
   <p:cSld>
     <p:spTree>
@@ -18889,336 +19728,6 @@
       </p:grpSpPr>
       <p:sp>
         <p:nvSpPr>
-          <p:cNvPr id="3" name="Title 2">
-            <a:extLst>
-              <a:ext uri="{FF2B5EF4-FFF2-40B4-BE49-F238E27FC236}">
-                <a16:creationId xmlns:a16="http://schemas.microsoft.com/office/drawing/2014/main" id="{A686C49A-FDE9-45BE-B673-5D31CA44CF0A}"/>
-              </a:ext>
-            </a:extLst>
-          </p:cNvPr>
-          <p:cNvSpPr>
-            <a:spLocks noGrp="1"/>
-          </p:cNvSpPr>
-          <p:nvPr>
-            <p:ph type="title"/>
-          </p:nvPr>
-        </p:nvSpPr>
-        <p:spPr/>
-        <p:txBody>
-          <a:bodyPr/>
-          <a:lstStyle/>
-          <a:p>
-            <a:r>
-              <a:rPr lang="en-US" dirty="0">
-                <a:solidFill>
-                  <a:schemeClr val="bg1"/>
-                </a:solidFill>
-              </a:rPr>
-              <a:t>Xamarin Forms Rendering Model - Entry</a:t>
-            </a:r>
-          </a:p>
-        </p:txBody>
-      </p:sp>
-      <p:pic>
-        <p:nvPicPr>
-          <p:cNvPr id="2050" name="Picture 2" descr="Image result for entry in xamarin forms">
-            <a:extLst>
-              <a:ext uri="{FF2B5EF4-FFF2-40B4-BE49-F238E27FC236}">
-                <a16:creationId xmlns:a16="http://schemas.microsoft.com/office/drawing/2014/main" id="{F5119428-AEB3-4C70-AA6E-0222C9642464}"/>
-              </a:ext>
-            </a:extLst>
-          </p:cNvPr>
-          <p:cNvPicPr>
-            <a:picLocks noChangeAspect="1" noChangeArrowheads="1"/>
-          </p:cNvPicPr>
-          <p:nvPr/>
-        </p:nvPicPr>
-        <p:blipFill>
-          <a:blip r:embed="rId2">
-            <a:extLst>
-              <a:ext uri="{28A0092B-C50C-407E-A947-70E740481C1C}">
-                <a14:useLocalDpi xmlns:a14="http://schemas.microsoft.com/office/drawing/2010/main" val="0"/>
-              </a:ext>
-            </a:extLst>
-          </a:blip>
-          <a:srcRect/>
-          <a:stretch>
-            <a:fillRect/>
-          </a:stretch>
-        </p:blipFill>
-        <p:spPr bwMode="auto">
-          <a:xfrm>
-            <a:off x="1485900" y="1715082"/>
-            <a:ext cx="9220200" cy="4308406"/>
-          </a:xfrm>
-          <a:prstGeom prst="rect">
-            <a:avLst/>
-          </a:prstGeom>
-          <a:noFill/>
-          <a:extLst>
-            <a:ext uri="{909E8E84-426E-40DD-AFC4-6F175D3DCCD1}">
-              <a14:hiddenFill xmlns:a14="http://schemas.microsoft.com/office/drawing/2010/main">
-                <a:solidFill>
-                  <a:srgbClr val="FFFFFF"/>
-                </a:solidFill>
-              </a14:hiddenFill>
-            </a:ext>
-          </a:extLst>
-        </p:spPr>
-      </p:pic>
-    </p:spTree>
-    <p:extLst>
-      <p:ext uri="{BB962C8B-B14F-4D97-AF65-F5344CB8AC3E}">
-        <p14:creationId xmlns:p14="http://schemas.microsoft.com/office/powerpoint/2010/main" val="3837174509"/>
-      </p:ext>
-    </p:extLst>
-  </p:cSld>
-  <p:clrMapOvr>
-    <a:masterClrMapping/>
-  </p:clrMapOvr>
-  <mc:AlternateContent xmlns:mc="http://schemas.openxmlformats.org/markup-compatibility/2006" xmlns:p14="http://schemas.microsoft.com/office/powerpoint/2010/main">
-    <mc:Choice Requires="p14">
-      <p:transition spd="slow">
-        <p14:reveal/>
-      </p:transition>
-    </mc:Choice>
-    <mc:Fallback xmlns="">
-      <p:transition spd="slow">
-        <p:fade/>
-      </p:transition>
-    </mc:Fallback>
-  </mc:AlternateContent>
-</p:sld>
-</file>
-
-<file path=ppt/slides/slide5.xml><?xml version="1.0" encoding="utf-8"?>
-<p:sld xmlns:a="http://schemas.openxmlformats.org/drawingml/2006/main" xmlns:r="http://schemas.openxmlformats.org/officeDocument/2006/relationships" xmlns:p="http://schemas.openxmlformats.org/presentationml/2006/main">
-  <p:cSld>
-    <p:spTree>
-      <p:nvGrpSpPr>
-        <p:cNvPr id="1" name=""/>
-        <p:cNvGrpSpPr/>
-        <p:nvPr/>
-      </p:nvGrpSpPr>
-      <p:grpSpPr>
-        <a:xfrm>
-          <a:off x="0" y="0"/>
-          <a:ext cx="0" cy="0"/>
-          <a:chOff x="0" y="0"/>
-          <a:chExt cx="0" cy="0"/>
-        </a:xfrm>
-      </p:grpSpPr>
-      <p:sp>
-        <p:nvSpPr>
-          <p:cNvPr id="3" name="Title 2">
-            <a:extLst>
-              <a:ext uri="{FF2B5EF4-FFF2-40B4-BE49-F238E27FC236}">
-                <a16:creationId xmlns:a16="http://schemas.microsoft.com/office/drawing/2014/main" id="{A686C49A-FDE9-45BE-B673-5D31CA44CF0A}"/>
-              </a:ext>
-            </a:extLst>
-          </p:cNvPr>
-          <p:cNvSpPr>
-            <a:spLocks noGrp="1"/>
-          </p:cNvSpPr>
-          <p:nvPr>
-            <p:ph type="title"/>
-          </p:nvPr>
-        </p:nvSpPr>
-        <p:spPr/>
-        <p:txBody>
-          <a:bodyPr/>
-          <a:lstStyle/>
-          <a:p>
-            <a:pPr defTabSz="932742"/>
-            <a:r>
-              <a:rPr lang="en-US" sz="4800" spc="-102" dirty="0">
-                <a:solidFill>
-                  <a:schemeClr val="bg1"/>
-                </a:solidFill>
-                <a:latin typeface="+mn-lt"/>
-              </a:rPr>
-              <a:t>Xamarin.Forms Rendering Model</a:t>
-            </a:r>
-            <a:br>
-              <a:rPr lang="en-US" sz="4800" spc="-102" dirty="0">
-                <a:solidFill>
-                  <a:schemeClr val="bg1"/>
-                </a:solidFill>
-                <a:latin typeface="+mn-lt"/>
-              </a:rPr>
-            </a:br>
-            <a:endParaRPr lang="en-US" sz="4800" spc="-102" dirty="0">
-              <a:solidFill>
-                <a:schemeClr val="bg1"/>
-              </a:solidFill>
-              <a:latin typeface="+mn-lt"/>
-            </a:endParaRPr>
-          </a:p>
-        </p:txBody>
-      </p:sp>
-      <p:pic>
-        <p:nvPicPr>
-          <p:cNvPr id="4" name="Picture 3">
-            <a:extLst>
-              <a:ext uri="{FF2B5EF4-FFF2-40B4-BE49-F238E27FC236}">
-                <a16:creationId xmlns:a16="http://schemas.microsoft.com/office/drawing/2014/main" id="{33224597-247D-42C7-A9DB-D8752450668F}"/>
-              </a:ext>
-            </a:extLst>
-          </p:cNvPr>
-          <p:cNvPicPr>
-            <a:picLocks noChangeAspect="1"/>
-          </p:cNvPicPr>
-          <p:nvPr/>
-        </p:nvPicPr>
-        <p:blipFill>
-          <a:blip r:embed="rId2"/>
-          <a:stretch>
-            <a:fillRect/>
-          </a:stretch>
-        </p:blipFill>
-        <p:spPr>
-          <a:xfrm>
-            <a:off x="0" y="1157681"/>
-            <a:ext cx="12192000" cy="5742264"/>
-          </a:xfrm>
-          <a:prstGeom prst="rect">
-            <a:avLst/>
-          </a:prstGeom>
-        </p:spPr>
-      </p:pic>
-    </p:spTree>
-    <p:extLst>
-      <p:ext uri="{BB962C8B-B14F-4D97-AF65-F5344CB8AC3E}">
-        <p14:creationId xmlns:p14="http://schemas.microsoft.com/office/powerpoint/2010/main" val="1341629389"/>
-      </p:ext>
-    </p:extLst>
-  </p:cSld>
-  <p:clrMapOvr>
-    <a:masterClrMapping/>
-  </p:clrMapOvr>
-  <mc:AlternateContent xmlns:mc="http://schemas.openxmlformats.org/markup-compatibility/2006" xmlns:p14="http://schemas.microsoft.com/office/powerpoint/2010/main">
-    <mc:Choice Requires="p14">
-      <p:transition spd="slow">
-        <p14:reveal/>
-      </p:transition>
-    </mc:Choice>
-    <mc:Fallback xmlns="">
-      <p:transition spd="slow">
-        <p:fade/>
-      </p:transition>
-    </mc:Fallback>
-  </mc:AlternateContent>
-</p:sld>
-</file>
-
-<file path=ppt/slides/slide6.xml><?xml version="1.0" encoding="utf-8"?>
-<p:sld xmlns:a="http://schemas.openxmlformats.org/drawingml/2006/main" xmlns:r="http://schemas.openxmlformats.org/officeDocument/2006/relationships" xmlns:p="http://schemas.openxmlformats.org/presentationml/2006/main">
-  <p:cSld>
-    <p:spTree>
-      <p:nvGrpSpPr>
-        <p:cNvPr id="1" name=""/>
-        <p:cNvGrpSpPr/>
-        <p:nvPr/>
-      </p:nvGrpSpPr>
-      <p:grpSpPr>
-        <a:xfrm>
-          <a:off x="0" y="0"/>
-          <a:ext cx="0" cy="0"/>
-          <a:chOff x="0" y="0"/>
-          <a:chExt cx="0" cy="0"/>
-        </a:xfrm>
-      </p:grpSpPr>
-      <p:pic>
-        <p:nvPicPr>
-          <p:cNvPr id="9222" name="Picture 6" descr="Related image">
-            <a:extLst>
-              <a:ext uri="{FF2B5EF4-FFF2-40B4-BE49-F238E27FC236}">
-                <a16:creationId xmlns:a16="http://schemas.microsoft.com/office/drawing/2014/main" id="{DBAD47F8-3CE0-408C-B165-092C6F2B9E71}"/>
-              </a:ext>
-            </a:extLst>
-          </p:cNvPr>
-          <p:cNvPicPr>
-            <a:picLocks noChangeAspect="1" noChangeArrowheads="1"/>
-          </p:cNvPicPr>
-          <p:nvPr/>
-        </p:nvPicPr>
-        <p:blipFill>
-          <a:blip r:embed="rId3">
-            <a:extLst>
-              <a:ext uri="{28A0092B-C50C-407E-A947-70E740481C1C}">
-                <a14:useLocalDpi xmlns:a14="http://schemas.microsoft.com/office/drawing/2010/main" val="0"/>
-              </a:ext>
-            </a:extLst>
-          </a:blip>
-          <a:srcRect/>
-          <a:stretch>
-            <a:fillRect/>
-          </a:stretch>
-        </p:blipFill>
-        <p:spPr bwMode="auto">
-          <a:xfrm>
-            <a:off x="20523" y="995419"/>
-            <a:ext cx="12158083" cy="4768772"/>
-          </a:xfrm>
-          <a:prstGeom prst="rect">
-            <a:avLst/>
-          </a:prstGeom>
-          <a:noFill/>
-          <a:extLst>
-            <a:ext uri="{909E8E84-426E-40DD-AFC4-6F175D3DCCD1}">
-              <a14:hiddenFill xmlns:a14="http://schemas.microsoft.com/office/drawing/2010/main">
-                <a:solidFill>
-                  <a:srgbClr val="FFFFFF"/>
-                </a:solidFill>
-              </a14:hiddenFill>
-            </a:ext>
-          </a:extLst>
-        </p:spPr>
-      </p:pic>
-    </p:spTree>
-    <p:extLst>
-      <p:ext uri="{BB962C8B-B14F-4D97-AF65-F5344CB8AC3E}">
-        <p14:creationId xmlns:p14="http://schemas.microsoft.com/office/powerpoint/2010/main" val="4223177934"/>
-      </p:ext>
-    </p:extLst>
-  </p:cSld>
-  <p:clrMapOvr>
-    <a:masterClrMapping/>
-  </p:clrMapOvr>
-  <mc:AlternateContent xmlns:mc="http://schemas.openxmlformats.org/markup-compatibility/2006" xmlns:p14="http://schemas.microsoft.com/office/powerpoint/2010/main">
-    <mc:Choice Requires="p14">
-      <p:transition spd="slow">
-        <p14:reveal/>
-      </p:transition>
-    </mc:Choice>
-    <mc:Fallback xmlns="">
-      <p:transition spd="slow">
-        <p:fade/>
-      </p:transition>
-    </mc:Fallback>
-  </mc:AlternateContent>
-</p:sld>
-</file>
-
-<file path=ppt/slides/slide7.xml><?xml version="1.0" encoding="utf-8"?>
-<p:sld xmlns:a="http://schemas.openxmlformats.org/drawingml/2006/main" xmlns:r="http://schemas.openxmlformats.org/officeDocument/2006/relationships" xmlns:p="http://schemas.openxmlformats.org/presentationml/2006/main">
-  <p:cSld>
-    <p:spTree>
-      <p:nvGrpSpPr>
-        <p:cNvPr id="1" name=""/>
-        <p:cNvGrpSpPr/>
-        <p:nvPr/>
-      </p:nvGrpSpPr>
-      <p:grpSpPr>
-        <a:xfrm>
-          <a:off x="0" y="0"/>
-          <a:ext cx="0" cy="0"/>
-          <a:chOff x="0" y="0"/>
-          <a:chExt cx="0" cy="0"/>
-        </a:xfrm>
-      </p:grpSpPr>
-      <p:sp>
-        <p:nvSpPr>
           <p:cNvPr id="2" name="Title 1"/>
           <p:cNvSpPr>
             <a:spLocks noGrp="1"/>
@@ -19747,7 +20256,7 @@
 </p:sld>
 </file>
 
-<file path=ppt/slides/slide8.xml><?xml version="1.0" encoding="utf-8"?>
+<file path=ppt/slides/slide5.xml><?xml version="1.0" encoding="utf-8"?>
 <p:sld xmlns:a="http://schemas.openxmlformats.org/drawingml/2006/main" xmlns:r="http://schemas.openxmlformats.org/officeDocument/2006/relationships" xmlns:p="http://schemas.openxmlformats.org/presentationml/2006/main">
   <p:cSld>
     <p:spTree>
@@ -21457,7 +21966,248 @@
 </p:sld>
 </file>
 
-<file path=ppt/slides/slide9.xml><?xml version="1.0" encoding="utf-8"?>
+<file path=ppt/slides/slide6.xml><?xml version="1.0" encoding="utf-8"?>
+<p:sld xmlns:a="http://schemas.openxmlformats.org/drawingml/2006/main" xmlns:r="http://schemas.openxmlformats.org/officeDocument/2006/relationships" xmlns:p="http://schemas.openxmlformats.org/presentationml/2006/main">
+  <p:cSld>
+    <p:spTree>
+      <p:nvGrpSpPr>
+        <p:cNvPr id="1" name=""/>
+        <p:cNvGrpSpPr/>
+        <p:nvPr/>
+      </p:nvGrpSpPr>
+      <p:grpSpPr>
+        <a:xfrm>
+          <a:off x="0" y="0"/>
+          <a:ext cx="0" cy="0"/>
+          <a:chOff x="0" y="0"/>
+          <a:chExt cx="0" cy="0"/>
+        </a:xfrm>
+      </p:grpSpPr>
+      <p:sp>
+        <p:nvSpPr>
+          <p:cNvPr id="3" name="Title 2">
+            <a:extLst>
+              <a:ext uri="{FF2B5EF4-FFF2-40B4-BE49-F238E27FC236}">
+                <a16:creationId xmlns:a16="http://schemas.microsoft.com/office/drawing/2014/main" id="{A686C49A-FDE9-45BE-B673-5D31CA44CF0A}"/>
+              </a:ext>
+            </a:extLst>
+          </p:cNvPr>
+          <p:cNvSpPr>
+            <a:spLocks noGrp="1"/>
+          </p:cNvSpPr>
+          <p:nvPr>
+            <p:ph type="title"/>
+          </p:nvPr>
+        </p:nvSpPr>
+        <p:spPr/>
+        <p:txBody>
+          <a:bodyPr/>
+          <a:lstStyle/>
+          <a:p>
+            <a:r>
+              <a:rPr lang="en-US" dirty="0">
+                <a:solidFill>
+                  <a:schemeClr val="bg1"/>
+                </a:solidFill>
+              </a:rPr>
+              <a:t>Xamarin Forms Rendering Model - Entry</a:t>
+            </a:r>
+          </a:p>
+        </p:txBody>
+      </p:sp>
+      <p:pic>
+        <p:nvPicPr>
+          <p:cNvPr id="2050" name="Picture 2" descr="Image result for entry in xamarin forms">
+            <a:extLst>
+              <a:ext uri="{FF2B5EF4-FFF2-40B4-BE49-F238E27FC236}">
+                <a16:creationId xmlns:a16="http://schemas.microsoft.com/office/drawing/2014/main" id="{F5119428-AEB3-4C70-AA6E-0222C9642464}"/>
+              </a:ext>
+            </a:extLst>
+          </p:cNvPr>
+          <p:cNvPicPr>
+            <a:picLocks noChangeAspect="1" noChangeArrowheads="1"/>
+          </p:cNvPicPr>
+          <p:nvPr/>
+        </p:nvPicPr>
+        <p:blipFill>
+          <a:blip r:embed="rId2">
+            <a:extLst>
+              <a:ext uri="{28A0092B-C50C-407E-A947-70E740481C1C}">
+                <a14:useLocalDpi xmlns:a14="http://schemas.microsoft.com/office/drawing/2010/main" val="0"/>
+              </a:ext>
+            </a:extLst>
+          </a:blip>
+          <a:srcRect/>
+          <a:stretch>
+            <a:fillRect/>
+          </a:stretch>
+        </p:blipFill>
+        <p:spPr bwMode="auto">
+          <a:xfrm>
+            <a:off x="1485900" y="1715082"/>
+            <a:ext cx="9220200" cy="4308406"/>
+          </a:xfrm>
+          <a:prstGeom prst="rect">
+            <a:avLst/>
+          </a:prstGeom>
+          <a:noFill/>
+          <a:extLst>
+            <a:ext uri="{909E8E84-426E-40DD-AFC4-6F175D3DCCD1}">
+              <a14:hiddenFill xmlns:a14="http://schemas.microsoft.com/office/drawing/2010/main">
+                <a:solidFill>
+                  <a:srgbClr val="FFFFFF"/>
+                </a:solidFill>
+              </a14:hiddenFill>
+            </a:ext>
+          </a:extLst>
+        </p:spPr>
+      </p:pic>
+    </p:spTree>
+    <p:extLst>
+      <p:ext uri="{BB962C8B-B14F-4D97-AF65-F5344CB8AC3E}">
+        <p14:creationId xmlns:p14="http://schemas.microsoft.com/office/powerpoint/2010/main" val="3837174509"/>
+      </p:ext>
+    </p:extLst>
+  </p:cSld>
+  <p:clrMapOvr>
+    <a:masterClrMapping/>
+  </p:clrMapOvr>
+  <mc:AlternateContent xmlns:mc="http://schemas.openxmlformats.org/markup-compatibility/2006" xmlns:p14="http://schemas.microsoft.com/office/powerpoint/2010/main">
+    <mc:Choice Requires="p14">
+      <p:transition spd="slow">
+        <p14:reveal/>
+      </p:transition>
+    </mc:Choice>
+    <mc:Fallback xmlns="">
+      <p:transition spd="slow">
+        <p:fade/>
+      </p:transition>
+    </mc:Fallback>
+  </mc:AlternateContent>
+</p:sld>
+</file>
+
+<file path=ppt/slides/slide7.xml><?xml version="1.0" encoding="utf-8"?>
+<p:sld xmlns:a="http://schemas.openxmlformats.org/drawingml/2006/main" xmlns:r="http://schemas.openxmlformats.org/officeDocument/2006/relationships" xmlns:p="http://schemas.openxmlformats.org/presentationml/2006/main">
+  <p:cSld>
+    <p:spTree>
+      <p:nvGrpSpPr>
+        <p:cNvPr id="1" name=""/>
+        <p:cNvGrpSpPr/>
+        <p:nvPr/>
+      </p:nvGrpSpPr>
+      <p:grpSpPr>
+        <a:xfrm>
+          <a:off x="0" y="0"/>
+          <a:ext cx="0" cy="0"/>
+          <a:chOff x="0" y="0"/>
+          <a:chExt cx="0" cy="0"/>
+        </a:xfrm>
+      </p:grpSpPr>
+      <p:sp>
+        <p:nvSpPr>
+          <p:cNvPr id="3" name="Title 2">
+            <a:extLst>
+              <a:ext uri="{FF2B5EF4-FFF2-40B4-BE49-F238E27FC236}">
+                <a16:creationId xmlns:a16="http://schemas.microsoft.com/office/drawing/2014/main" id="{A686C49A-FDE9-45BE-B673-5D31CA44CF0A}"/>
+              </a:ext>
+            </a:extLst>
+          </p:cNvPr>
+          <p:cNvSpPr>
+            <a:spLocks noGrp="1"/>
+          </p:cNvSpPr>
+          <p:nvPr>
+            <p:ph type="title"/>
+          </p:nvPr>
+        </p:nvSpPr>
+        <p:spPr/>
+        <p:txBody>
+          <a:bodyPr/>
+          <a:lstStyle/>
+          <a:p>
+            <a:pPr defTabSz="932742"/>
+            <a:r>
+              <a:rPr lang="en-US" sz="4800" spc="-102" dirty="0">
+                <a:solidFill>
+                  <a:schemeClr val="bg1"/>
+                </a:solidFill>
+                <a:latin typeface="+mn-lt"/>
+              </a:rPr>
+              <a:t>Xamarin.Forms Rendering Model</a:t>
+            </a:r>
+            <a:br>
+              <a:rPr lang="en-US" sz="4800" spc="-102" dirty="0">
+                <a:solidFill>
+                  <a:schemeClr val="bg1"/>
+                </a:solidFill>
+                <a:latin typeface="+mn-lt"/>
+              </a:rPr>
+            </a:br>
+            <a:endParaRPr lang="en-US" sz="4800" spc="-102" dirty="0">
+              <a:solidFill>
+                <a:schemeClr val="bg1"/>
+              </a:solidFill>
+              <a:latin typeface="+mn-lt"/>
+            </a:endParaRPr>
+          </a:p>
+        </p:txBody>
+      </p:sp>
+      <p:pic>
+        <p:nvPicPr>
+          <p:cNvPr id="4" name="Picture 3">
+            <a:extLst>
+              <a:ext uri="{FF2B5EF4-FFF2-40B4-BE49-F238E27FC236}">
+                <a16:creationId xmlns:a16="http://schemas.microsoft.com/office/drawing/2014/main" id="{33224597-247D-42C7-A9DB-D8752450668F}"/>
+              </a:ext>
+            </a:extLst>
+          </p:cNvPr>
+          <p:cNvPicPr>
+            <a:picLocks noChangeAspect="1"/>
+          </p:cNvPicPr>
+          <p:nvPr/>
+        </p:nvPicPr>
+        <p:blipFill>
+          <a:blip r:embed="rId2"/>
+          <a:stretch>
+            <a:fillRect/>
+          </a:stretch>
+        </p:blipFill>
+        <p:spPr>
+          <a:xfrm>
+            <a:off x="0" y="1157681"/>
+            <a:ext cx="12192000" cy="5742264"/>
+          </a:xfrm>
+          <a:prstGeom prst="rect">
+            <a:avLst/>
+          </a:prstGeom>
+        </p:spPr>
+      </p:pic>
+    </p:spTree>
+    <p:extLst>
+      <p:ext uri="{BB962C8B-B14F-4D97-AF65-F5344CB8AC3E}">
+        <p14:creationId xmlns:p14="http://schemas.microsoft.com/office/powerpoint/2010/main" val="1341629389"/>
+      </p:ext>
+    </p:extLst>
+  </p:cSld>
+  <p:clrMapOvr>
+    <a:masterClrMapping/>
+  </p:clrMapOvr>
+  <mc:AlternateContent xmlns:mc="http://schemas.openxmlformats.org/markup-compatibility/2006" xmlns:p14="http://schemas.microsoft.com/office/powerpoint/2010/main">
+    <mc:Choice Requires="p14">
+      <p:transition spd="slow">
+        <p14:reveal/>
+      </p:transition>
+    </mc:Choice>
+    <mc:Fallback xmlns="">
+      <p:transition spd="slow">
+        <p:fade/>
+      </p:transition>
+    </mc:Fallback>
+  </mc:AlternateContent>
+</p:sld>
+</file>
+
+<file path=ppt/slides/slide8.xml><?xml version="1.0" encoding="utf-8"?>
 <p:sld xmlns:a="http://schemas.openxmlformats.org/drawingml/2006/main" xmlns:r="http://schemas.openxmlformats.org/officeDocument/2006/relationships" xmlns:p="http://schemas.openxmlformats.org/presentationml/2006/main">
   <p:cSld>
     <p:spTree>
@@ -23168,6 +23918,95 @@
 </p:sld>
 </file>
 
+<file path=ppt/slides/slide9.xml><?xml version="1.0" encoding="utf-8"?>
+<p:sld xmlns:a="http://schemas.openxmlformats.org/drawingml/2006/main" xmlns:r="http://schemas.openxmlformats.org/officeDocument/2006/relationships" xmlns:p="http://schemas.openxmlformats.org/presentationml/2006/main">
+  <p:cSld>
+    <p:spTree>
+      <p:nvGrpSpPr>
+        <p:cNvPr id="1" name=""/>
+        <p:cNvGrpSpPr/>
+        <p:nvPr/>
+      </p:nvGrpSpPr>
+      <p:grpSpPr>
+        <a:xfrm>
+          <a:off x="0" y="0"/>
+          <a:ext cx="0" cy="0"/>
+          <a:chOff x="0" y="0"/>
+          <a:chExt cx="0" cy="0"/>
+        </a:xfrm>
+      </p:grpSpPr>
+      <p:pic>
+        <p:nvPicPr>
+          <p:cNvPr id="9222" name="Picture 6" descr="Related image">
+            <a:extLst>
+              <a:ext uri="{FF2B5EF4-FFF2-40B4-BE49-F238E27FC236}">
+                <a16:creationId xmlns:a16="http://schemas.microsoft.com/office/drawing/2014/main" id="{DBAD47F8-3CE0-408C-B165-092C6F2B9E71}"/>
+              </a:ext>
+            </a:extLst>
+          </p:cNvPr>
+          <p:cNvPicPr>
+            <a:picLocks noChangeAspect="1" noChangeArrowheads="1"/>
+          </p:cNvPicPr>
+          <p:nvPr/>
+        </p:nvPicPr>
+        <p:blipFill>
+          <a:blip r:embed="rId3">
+            <a:extLst>
+              <a:ext uri="{28A0092B-C50C-407E-A947-70E740481C1C}">
+                <a14:useLocalDpi xmlns:a14="http://schemas.microsoft.com/office/drawing/2010/main" val="0"/>
+              </a:ext>
+            </a:extLst>
+          </a:blip>
+          <a:srcRect/>
+          <a:stretch>
+            <a:fillRect/>
+          </a:stretch>
+        </p:blipFill>
+        <p:spPr bwMode="auto">
+          <a:xfrm>
+            <a:off x="20523" y="995419"/>
+            <a:ext cx="12158083" cy="4768772"/>
+          </a:xfrm>
+          <a:prstGeom prst="rect">
+            <a:avLst/>
+          </a:prstGeom>
+          <a:noFill/>
+          <a:extLst>
+            <a:ext uri="{909E8E84-426E-40DD-AFC4-6F175D3DCCD1}">
+              <a14:hiddenFill xmlns:a14="http://schemas.microsoft.com/office/drawing/2010/main">
+                <a:solidFill>
+                  <a:srgbClr val="FFFFFF"/>
+                </a:solidFill>
+              </a14:hiddenFill>
+            </a:ext>
+          </a:extLst>
+        </p:spPr>
+      </p:pic>
+    </p:spTree>
+    <p:extLst>
+      <p:ext uri="{BB962C8B-B14F-4D97-AF65-F5344CB8AC3E}">
+        <p14:creationId xmlns:p14="http://schemas.microsoft.com/office/powerpoint/2010/main" val="4223177934"/>
+      </p:ext>
+    </p:extLst>
+  </p:cSld>
+  <p:clrMapOvr>
+    <a:masterClrMapping/>
+  </p:clrMapOvr>
+  <mc:AlternateContent xmlns:mc="http://schemas.openxmlformats.org/markup-compatibility/2006" xmlns:p14="http://schemas.microsoft.com/office/powerpoint/2010/main">
+    <mc:Choice Requires="p14">
+      <p:transition spd="slow">
+        <p14:reveal/>
+      </p:transition>
+    </mc:Choice>
+    <mc:Fallback xmlns="">
+      <p:transition spd="slow">
+        <p:fade/>
+      </p:transition>
+    </mc:Fallback>
+  </mc:AlternateContent>
+</p:sld>
+</file>
+
 <file path=ppt/theme/theme1.xml><?xml version="1.0" encoding="utf-8"?>
 <a:theme xmlns:a="http://schemas.openxmlformats.org/drawingml/2006/main" name="5-30629_Build_Template_WHITE">
   <a:themeElements>

</xml_diff>

<commit_message>
Slide document changes are committed.
</commit_message>
<xml_diff>
--- a/Slide/XamarinForms-Prism.pptx
+++ b/Slide/XamarinForms-Prism.pptx
@@ -296,7 +296,7 @@
           <a:p>
             <a:fld id="{A334C884-B1D7-A043-A4AA-521744755A4B}" type="datetimeFigureOut">
               <a:rPr lang="en-US" smtClean="0"/>
-              <a:t>12/28/2019</a:t>
+              <a:t>12/29/2019</a:t>
             </a:fld>
             <a:endParaRPr lang="en-US" dirty="0"/>
           </a:p>
@@ -1458,7 +1458,7 @@
           <a:p>
             <a:fld id="{61B0BD91-A332-4638-9D55-E1550E13BA63}" type="datetime8">
               <a:rPr lang="en-US" smtClean="0"/>
-              <a:t>12/28/2019 3:04 AM</a:t>
+              <a:t>12/29/2019 1:14 PM</a:t>
             </a:fld>
             <a:endParaRPr lang="en-US" dirty="0"/>
           </a:p>
@@ -1640,7 +1640,7 @@
           <a:p>
             <a:fld id="{61B0BD91-A332-4638-9D55-E1550E13BA63}" type="datetime8">
               <a:rPr lang="en-US" smtClean="0"/>
-              <a:t>12/28/2019 3:04 AM</a:t>
+              <a:t>12/29/2019 12:45 PM</a:t>
             </a:fld>
             <a:endParaRPr lang="en-US" dirty="0"/>
           </a:p>
@@ -1965,7 +1965,7 @@
                 <a:tabLst/>
                 <a:defRPr/>
               </a:pPr>
-              <a:t>12/28/2019</a:t>
+              <a:t>12/29/2019</a:t>
             </a:fld>
             <a:endParaRPr kumimoji="0" lang="en-US" sz="1800" b="0" i="0" u="none" strike="noStrike" kern="0" cap="none" spc="0" normalizeH="0" baseline="0" noProof="0" dirty="0">
               <a:ln>
@@ -2201,7 +2201,7 @@
           <a:p>
             <a:fld id="{61B0BD91-A332-4638-9D55-E1550E13BA63}" type="datetime8">
               <a:rPr lang="en-US" smtClean="0"/>
-              <a:t>12/28/2019 3:04 AM</a:t>
+              <a:t>12/29/2019 12:45 PM</a:t>
             </a:fld>
             <a:endParaRPr lang="en-US" dirty="0"/>
           </a:p>
@@ -2880,7 +2880,7 @@
                 </a:solidFill>
               </a:rPr>
               <a:pPr/>
-              <a:t>12/28/2019</a:t>
+              <a:t>12/29/2019</a:t>
             </a:fld>
             <a:endParaRPr lang="en-US" dirty="0">
               <a:solidFill>
@@ -15326,7 +15326,7 @@
       <p:sp>
         <p:nvSpPr>
           <p:cNvPr id="52" name="TextBox 51">
-            <a:hlinkClick r:id="rId4" tooltip="https://www.linkedin.com/in/harikrishnan-natarajan"/>
+            <a:hlinkClick r:id="rId8" tooltip="https://www.linkedin.com/in/cnharikrishnan"/>
             <a:extLst>
               <a:ext uri="{FF2B5EF4-FFF2-40B4-BE49-F238E27FC236}">
                 <a16:creationId xmlns:a16="http://schemas.microsoft.com/office/drawing/2014/main" id="{D921F0D6-C05C-4B55-9F6C-FDF5CDC89FA7}"/>
@@ -15364,7 +15364,7 @@
                 </a:solidFill>
                 <a:cs typeface="Arial"/>
               </a:rPr>
-              <a:t>harikrishnan-natarajan</a:t>
+              <a:t>cnharikrishnan</a:t>
             </a:r>
             <a:endParaRPr lang="en-US" sz="1650" dirty="0">
               <a:solidFill>
@@ -15379,7 +15379,7 @@
       <p:sp>
         <p:nvSpPr>
           <p:cNvPr id="53" name="TextBox 52">
-            <a:hlinkClick r:id="rId8" tooltip="https://github.com/harikrishnann"/>
+            <a:hlinkClick r:id="rId9" tooltip="https://github.com/cnharikrishnan"/>
             <a:extLst>
               <a:ext uri="{FF2B5EF4-FFF2-40B4-BE49-F238E27FC236}">
                 <a16:creationId xmlns:a16="http://schemas.microsoft.com/office/drawing/2014/main" id="{5F972209-B5A7-4ACE-BD21-D53FF8AB80EF}"/>
@@ -15417,7 +15417,7 @@
                 </a:solidFill>
                 <a:cs typeface="Arial"/>
               </a:rPr>
-              <a:t>harikrishnann</a:t>
+              <a:t>cnharikrishnan</a:t>
             </a:r>
           </a:p>
         </p:txBody>
@@ -15425,7 +15425,7 @@
       <p:pic>
         <p:nvPicPr>
           <p:cNvPr id="3" name="Picture 2">
-            <a:hlinkClick r:id="rId8" tooltip="https://github.com/harikrishnann"/>
+            <a:hlinkClick r:id="rId10" tooltip="https://github.com/harikrishnann"/>
             <a:extLst>
               <a:ext uri="{FF2B5EF4-FFF2-40B4-BE49-F238E27FC236}">
                 <a16:creationId xmlns:a16="http://schemas.microsoft.com/office/drawing/2014/main" id="{16B7B645-1CF7-48A9-9234-D90908090842}"/>
@@ -15438,7 +15438,7 @@
           <p:nvPr/>
         </p:nvPicPr>
         <p:blipFill>
-          <a:blip r:embed="rId9"/>
+          <a:blip r:embed="rId11"/>
           <a:stretch>
             <a:fillRect/>
           </a:stretch>
@@ -15456,7 +15456,7 @@
       <p:pic>
         <p:nvPicPr>
           <p:cNvPr id="5" name="Picture 4">
-            <a:hlinkClick r:id="rId10" tooltip="https://www.facebook.com/nharishkrish"/>
+            <a:hlinkClick r:id="rId12" tooltip="https://www.facebook.com/nharishkrish"/>
             <a:extLst>
               <a:ext uri="{FF2B5EF4-FFF2-40B4-BE49-F238E27FC236}">
                 <a16:creationId xmlns:a16="http://schemas.microsoft.com/office/drawing/2014/main" id="{3AB1009D-9B3F-488D-99A1-508221B1DBF6}"/>
@@ -15469,7 +15469,7 @@
           <p:nvPr/>
         </p:nvPicPr>
         <p:blipFill>
-          <a:blip r:embed="rId11"/>
+          <a:blip r:embed="rId13"/>
           <a:stretch>
             <a:fillRect/>
           </a:stretch>
@@ -15487,7 +15487,7 @@
       <p:sp>
         <p:nvSpPr>
           <p:cNvPr id="22" name="TextBox 21">
-            <a:hlinkClick r:id="rId10" tooltip="https://www.facebook.com/nharishkrish"/>
+            <a:hlinkClick r:id="rId14" tooltip="https://www.facebook.com/cnharikrishnann"/>
             <a:extLst>
               <a:ext uri="{FF2B5EF4-FFF2-40B4-BE49-F238E27FC236}">
                 <a16:creationId xmlns:a16="http://schemas.microsoft.com/office/drawing/2014/main" id="{8095644F-57AD-40EF-A253-AB81E5F39216}"/>
@@ -15525,7 +15525,7 @@
                 </a:solidFill>
                 <a:cs typeface="Arial"/>
               </a:rPr>
-              <a:t>nharishkrish</a:t>
+              <a:t>cnharikrishnann</a:t>
             </a:r>
             <a:endParaRPr lang="en-US" sz="1650" dirty="0">
               <a:solidFill>
@@ -18326,10 +18326,10 @@
       </p:sp>
       <p:sp>
         <p:nvSpPr>
-          <p:cNvPr id="41" name="Rectangle 40">
+          <p:cNvPr id="14" name="Rectangle 13">
             <a:extLst>
               <a:ext uri="{FF2B5EF4-FFF2-40B4-BE49-F238E27FC236}">
-                <a16:creationId xmlns:a16="http://schemas.microsoft.com/office/drawing/2014/main" id="{ECC1C31A-7A3C-4923-83D7-B3FBDF76E239}"/>
+                <a16:creationId xmlns:a16="http://schemas.microsoft.com/office/drawing/2014/main" id="{D9DC3A25-153A-46A6-97D1-23932F114E46}"/>
               </a:ext>
             </a:extLst>
           </p:cNvPr>
@@ -18338,7 +18338,7 @@
         </p:nvSpPr>
         <p:spPr>
           <a:xfrm>
-            <a:off x="4768524" y="4048023"/>
+            <a:off x="4403543" y="4048023"/>
             <a:ext cx="6684523" cy="757130"/>
           </a:xfrm>
           <a:prstGeom prst="rect">
@@ -18376,10 +18376,10 @@
       </p:sp>
       <p:cxnSp>
         <p:nvCxnSpPr>
-          <p:cNvPr id="42" name="Straight Connector 41">
+          <p:cNvPr id="15" name="Straight Connector 14">
             <a:extLst>
               <a:ext uri="{FF2B5EF4-FFF2-40B4-BE49-F238E27FC236}">
-                <a16:creationId xmlns:a16="http://schemas.microsoft.com/office/drawing/2014/main" id="{B5C5B9FA-9124-4050-9992-36F008BC140B}"/>
+                <a16:creationId xmlns:a16="http://schemas.microsoft.com/office/drawing/2014/main" id="{EDB7D8EE-F742-4150-97D5-D0DBAA545122}"/>
               </a:ext>
             </a:extLst>
           </p:cNvPr>
@@ -18390,7 +18390,7 @@
         </p:nvCxnSpPr>
         <p:spPr>
           <a:xfrm>
-            <a:off x="4837599" y="4886711"/>
+            <a:off x="4472618" y="4886711"/>
             <a:ext cx="6684523" cy="1715"/>
           </a:xfrm>
           <a:prstGeom prst="line">
@@ -18421,11 +18421,11 @@
       </p:cxnSp>
       <p:pic>
         <p:nvPicPr>
-          <p:cNvPr id="43" name="Picture 42">
+          <p:cNvPr id="16" name="Picture 15">
             <a:hlinkClick r:id="rId3" tooltip="https://www.linkedin.com/in/harikrishnan-natarajan"/>
             <a:extLst>
               <a:ext uri="{FF2B5EF4-FFF2-40B4-BE49-F238E27FC236}">
-                <a16:creationId xmlns:a16="http://schemas.microsoft.com/office/drawing/2014/main" id="{0A56B736-3CFE-41BC-8837-0DD2478CD9A4}"/>
+                <a16:creationId xmlns:a16="http://schemas.microsoft.com/office/drawing/2014/main" id="{89A7423D-D7F7-4160-BF19-53C5419FA92E}"/>
               </a:ext>
             </a:extLst>
           </p:cNvPr>
@@ -18442,7 +18442,7 @@
         </p:blipFill>
         <p:spPr>
           <a:xfrm>
-            <a:off x="4855056" y="5573285"/>
+            <a:off x="4490075" y="5573285"/>
             <a:ext cx="342900" cy="342900"/>
           </a:xfrm>
           <a:prstGeom prst="rect">
@@ -18452,11 +18452,11 @@
       </p:pic>
       <p:sp>
         <p:nvSpPr>
-          <p:cNvPr id="44" name="TextBox 43">
+          <p:cNvPr id="17" name="TextBox 16">
             <a:hlinkClick r:id="rId5" tooltip="https://twitter.com/cn_harikrishnan"/>
             <a:extLst>
               <a:ext uri="{FF2B5EF4-FFF2-40B4-BE49-F238E27FC236}">
-                <a16:creationId xmlns:a16="http://schemas.microsoft.com/office/drawing/2014/main" id="{D039355A-00F3-419E-BAF1-FE291B06F482}"/>
+                <a16:creationId xmlns:a16="http://schemas.microsoft.com/office/drawing/2014/main" id="{8D9277E0-69DD-4DB1-9DF9-A147CE4A9A77}"/>
               </a:ext>
             </a:extLst>
           </p:cNvPr>
@@ -18465,7 +18465,7 @@
         </p:nvSpPr>
         <p:spPr>
           <a:xfrm>
-            <a:off x="5197956" y="5039050"/>
+            <a:off x="4832975" y="5039050"/>
             <a:ext cx="2312117" cy="387798"/>
           </a:xfrm>
           <a:prstGeom prst="rect">
@@ -18504,11 +18504,11 @@
       </p:sp>
       <p:pic>
         <p:nvPicPr>
-          <p:cNvPr id="45" name="Picture 44">
+          <p:cNvPr id="18" name="Picture 17">
             <a:hlinkClick r:id="rId5" tooltip="https://twitter.com/cn_harikrishnan"/>
             <a:extLst>
               <a:ext uri="{FF2B5EF4-FFF2-40B4-BE49-F238E27FC236}">
-                <a16:creationId xmlns:a16="http://schemas.microsoft.com/office/drawing/2014/main" id="{1EC844A5-0846-42D9-A46A-C620740CA452}"/>
+                <a16:creationId xmlns:a16="http://schemas.microsoft.com/office/drawing/2014/main" id="{3AAF0C10-1CB5-4B29-8871-5F7664736410}"/>
               </a:ext>
             </a:extLst>
           </p:cNvPr>
@@ -18525,7 +18525,7 @@
         </p:blipFill>
         <p:spPr>
           <a:xfrm>
-            <a:off x="4863549" y="5083948"/>
+            <a:off x="4498568" y="5083948"/>
             <a:ext cx="342900" cy="342900"/>
           </a:xfrm>
           <a:prstGeom prst="rect">
@@ -18535,11 +18535,11 @@
       </p:pic>
       <p:sp>
         <p:nvSpPr>
-          <p:cNvPr id="46" name="TextBox 45">
-            <a:hlinkClick r:id="rId3" tooltip="https://www.linkedin.com/in/harikrishnan-natarajan"/>
+          <p:cNvPr id="19" name="TextBox 18">
+            <a:hlinkClick r:id="rId7" tooltip="https://www.linkedin.com/in/cnharikrishnan"/>
             <a:extLst>
               <a:ext uri="{FF2B5EF4-FFF2-40B4-BE49-F238E27FC236}">
-                <a16:creationId xmlns:a16="http://schemas.microsoft.com/office/drawing/2014/main" id="{B3347D74-9C9A-413F-A999-F7927D65F0D0}"/>
+                <a16:creationId xmlns:a16="http://schemas.microsoft.com/office/drawing/2014/main" id="{249D08B9-D29A-463A-A7FE-A6C6574372CF}"/>
               </a:ext>
             </a:extLst>
           </p:cNvPr>
@@ -18548,7 +18548,7 @@
         </p:nvSpPr>
         <p:spPr>
           <a:xfrm>
-            <a:off x="5212379" y="5524824"/>
+            <a:off x="4847398" y="5524824"/>
             <a:ext cx="2297694" cy="387798"/>
           </a:xfrm>
           <a:prstGeom prst="rect">
@@ -18574,7 +18574,7 @@
                 </a:solidFill>
                 <a:cs typeface="Arial"/>
               </a:rPr>
-              <a:t>harikrishnan-natarajan</a:t>
+              <a:t>cnharikrishnan</a:t>
             </a:r>
             <a:endParaRPr lang="en-US" sz="1650" dirty="0">
               <a:solidFill>
@@ -18588,11 +18588,11 @@
       </p:sp>
       <p:sp>
         <p:nvSpPr>
-          <p:cNvPr id="47" name="TextBox 46">
-            <a:hlinkClick r:id="rId7" tooltip="https://github.com/harikrishnann"/>
+          <p:cNvPr id="20" name="TextBox 19">
+            <a:hlinkClick r:id="rId8" tooltip="https://github.com/cnharikrishnan"/>
             <a:extLst>
               <a:ext uri="{FF2B5EF4-FFF2-40B4-BE49-F238E27FC236}">
-                <a16:creationId xmlns:a16="http://schemas.microsoft.com/office/drawing/2014/main" id="{BD7C433A-A986-4975-AB47-36AD9F89CBC2}"/>
+                <a16:creationId xmlns:a16="http://schemas.microsoft.com/office/drawing/2014/main" id="{AD6D2083-B612-43B2-B8BB-9A91E06EFB71}"/>
               </a:ext>
             </a:extLst>
           </p:cNvPr>
@@ -18601,7 +18601,7 @@
         </p:nvSpPr>
         <p:spPr>
           <a:xfrm>
-            <a:off x="9154747" y="5040683"/>
+            <a:off x="8789766" y="5040683"/>
             <a:ext cx="2297695" cy="387798"/>
           </a:xfrm>
           <a:prstGeom prst="rect">
@@ -18627,49 +18627,18 @@
                 </a:solidFill>
                 <a:cs typeface="Arial"/>
               </a:rPr>
-              <a:t>harikrishnann</a:t>
+              <a:t>cnharikrishnan</a:t>
             </a:r>
           </a:p>
         </p:txBody>
       </p:sp>
       <p:pic>
         <p:nvPicPr>
-          <p:cNvPr id="48" name="Picture 47">
-            <a:hlinkClick r:id="rId7" tooltip="https://github.com/harikrishnann"/>
+          <p:cNvPr id="21" name="Picture 20">
+            <a:hlinkClick r:id="rId9" tooltip="https://github.com/harikrishnann"/>
             <a:extLst>
               <a:ext uri="{FF2B5EF4-FFF2-40B4-BE49-F238E27FC236}">
-                <a16:creationId xmlns:a16="http://schemas.microsoft.com/office/drawing/2014/main" id="{09693B73-FAF8-4B64-8487-28A8FAA6883A}"/>
-              </a:ext>
-            </a:extLst>
-          </p:cNvPr>
-          <p:cNvPicPr>
-            <a:picLocks noChangeAspect="1"/>
-          </p:cNvPicPr>
-          <p:nvPr/>
-        </p:nvPicPr>
-        <p:blipFill>
-          <a:blip r:embed="rId8"/>
-          <a:stretch>
-            <a:fillRect/>
-          </a:stretch>
-        </p:blipFill>
-        <p:spPr>
-          <a:xfrm>
-            <a:off x="8817482" y="5077888"/>
-            <a:ext cx="342900" cy="342900"/>
-          </a:xfrm>
-          <a:prstGeom prst="rect">
-            <a:avLst/>
-          </a:prstGeom>
-        </p:spPr>
-      </p:pic>
-      <p:pic>
-        <p:nvPicPr>
-          <p:cNvPr id="49" name="Picture 48">
-            <a:hlinkClick r:id="rId9" tooltip="https://www.facebook.com/nharishkrish"/>
-            <a:extLst>
-              <a:ext uri="{FF2B5EF4-FFF2-40B4-BE49-F238E27FC236}">
-                <a16:creationId xmlns:a16="http://schemas.microsoft.com/office/drawing/2014/main" id="{A376D01B-D397-4B7B-8B46-F0F545D0E2BD}"/>
+                <a16:creationId xmlns:a16="http://schemas.microsoft.com/office/drawing/2014/main" id="{01135FCA-E26D-462F-A53B-7279A1064775}"/>
               </a:ext>
             </a:extLst>
           </p:cNvPr>
@@ -18686,7 +18655,38 @@
         </p:blipFill>
         <p:spPr>
           <a:xfrm>
-            <a:off x="8811847" y="5573285"/>
+            <a:off x="8452501" y="5077888"/>
+            <a:ext cx="342900" cy="342900"/>
+          </a:xfrm>
+          <a:prstGeom prst="rect">
+            <a:avLst/>
+          </a:prstGeom>
+        </p:spPr>
+      </p:pic>
+      <p:pic>
+        <p:nvPicPr>
+          <p:cNvPr id="22" name="Picture 21">
+            <a:hlinkClick r:id="rId11" tooltip="https://www.facebook.com/nharishkrish"/>
+            <a:extLst>
+              <a:ext uri="{FF2B5EF4-FFF2-40B4-BE49-F238E27FC236}">
+                <a16:creationId xmlns:a16="http://schemas.microsoft.com/office/drawing/2014/main" id="{8F23BB7B-8DF0-4185-8751-76FFA764EF15}"/>
+              </a:ext>
+            </a:extLst>
+          </p:cNvPr>
+          <p:cNvPicPr>
+            <a:picLocks noChangeAspect="1"/>
+          </p:cNvPicPr>
+          <p:nvPr/>
+        </p:nvPicPr>
+        <p:blipFill>
+          <a:blip r:embed="rId12"/>
+          <a:stretch>
+            <a:fillRect/>
+          </a:stretch>
+        </p:blipFill>
+        <p:spPr>
+          <a:xfrm>
+            <a:off x="8446866" y="5573285"/>
             <a:ext cx="342900" cy="342900"/>
           </a:xfrm>
           <a:prstGeom prst="rect">
@@ -18696,11 +18696,11 @@
       </p:pic>
       <p:sp>
         <p:nvSpPr>
-          <p:cNvPr id="50" name="TextBox 49">
-            <a:hlinkClick r:id="rId9" tooltip="https://www.facebook.com/nharishkrish"/>
+          <p:cNvPr id="23" name="TextBox 22">
+            <a:hlinkClick r:id="rId13" tooltip="https://www.facebook.com/cnharikrishnann"/>
             <a:extLst>
               <a:ext uri="{FF2B5EF4-FFF2-40B4-BE49-F238E27FC236}">
-                <a16:creationId xmlns:a16="http://schemas.microsoft.com/office/drawing/2014/main" id="{CAB8282E-078F-4A35-AE19-EB73505A4DEA}"/>
+                <a16:creationId xmlns:a16="http://schemas.microsoft.com/office/drawing/2014/main" id="{709F77E6-8B25-4F59-8AA3-C26CCBC5CC7E}"/>
               </a:ext>
             </a:extLst>
           </p:cNvPr>
@@ -18709,7 +18709,7 @@
         </p:nvSpPr>
         <p:spPr>
           <a:xfrm>
-            <a:off x="9160382" y="5524824"/>
+            <a:off x="8795401" y="5524824"/>
             <a:ext cx="2297694" cy="387798"/>
           </a:xfrm>
           <a:prstGeom prst="rect">
@@ -18735,7 +18735,7 @@
                 </a:solidFill>
                 <a:cs typeface="Arial"/>
               </a:rPr>
-              <a:t>nharishkrish</a:t>
+              <a:t>cnharikrishnann</a:t>
             </a:r>
             <a:endParaRPr lang="en-US" sz="1650" dirty="0">
               <a:solidFill>
@@ -18827,21 +18827,39 @@
                                   </p:childTnLst>
                                 </p:cTn>
                               </p:par>
+                            </p:childTnLst>
+                          </p:cTn>
+                        </p:par>
+                      </p:childTnLst>
+                    </p:cTn>
+                  </p:par>
+                  <p:par>
+                    <p:cTn id="8" fill="hold">
+                      <p:stCondLst>
+                        <p:cond delay="indefinite"/>
+                      </p:stCondLst>
+                      <p:childTnLst>
+                        <p:par>
+                          <p:cTn id="9" fill="hold">
+                            <p:stCondLst>
+                              <p:cond delay="0"/>
+                            </p:stCondLst>
+                            <p:childTnLst>
                               <p:par>
-                                <p:cTn id="8" presetID="21" presetClass="entr" presetSubtype="1" fill="hold" grpId="0" nodeType="withEffect">
+                                <p:cTn id="10" presetID="21" presetClass="entr" presetSubtype="1" fill="hold" grpId="0" nodeType="clickEffect">
                                   <p:stCondLst>
                                     <p:cond delay="0"/>
                                   </p:stCondLst>
                                   <p:childTnLst>
                                     <p:set>
                                       <p:cBhvr>
-                                        <p:cTn id="9" dur="1" fill="hold">
+                                        <p:cTn id="11" dur="1" fill="hold">
                                           <p:stCondLst>
                                             <p:cond delay="0"/>
                                           </p:stCondLst>
                                         </p:cTn>
                                         <p:tgtEl>
-                                          <p:spTgt spid="41"/>
+                                          <p:spTgt spid="14"/>
                                         </p:tgtEl>
                                         <p:attrNameLst>
                                           <p:attrName>style.visibility</p:attrName>
@@ -18853,9 +18871,9 @@
                                     </p:set>
                                     <p:animEffect transition="in" filter="wheel(1)">
                                       <p:cBhvr>
-                                        <p:cTn id="10" dur="500"/>
+                                        <p:cTn id="12" dur="1000"/>
                                         <p:tgtEl>
-                                          <p:spTgt spid="41"/>
+                                          <p:spTgt spid="14"/>
                                         </p:tgtEl>
                                       </p:cBhvr>
                                     </p:animEffect>
@@ -18863,20 +18881,20 @@
                                 </p:cTn>
                               </p:par>
                               <p:par>
-                                <p:cTn id="11" presetID="21" presetClass="entr" presetSubtype="1" fill="hold" nodeType="withEffect">
+                                <p:cTn id="13" presetID="21" presetClass="entr" presetSubtype="1" fill="hold" nodeType="withEffect">
                                   <p:stCondLst>
                                     <p:cond delay="0"/>
                                   </p:stCondLst>
                                   <p:childTnLst>
                                     <p:set>
                                       <p:cBhvr>
-                                        <p:cTn id="12" dur="1" fill="hold">
+                                        <p:cTn id="14" dur="1" fill="hold">
                                           <p:stCondLst>
                                             <p:cond delay="0"/>
                                           </p:stCondLst>
                                         </p:cTn>
                                         <p:tgtEl>
-                                          <p:spTgt spid="42"/>
+                                          <p:spTgt spid="15"/>
                                         </p:tgtEl>
                                         <p:attrNameLst>
                                           <p:attrName>style.visibility</p:attrName>
@@ -18888,9 +18906,9 @@
                                     </p:set>
                                     <p:animEffect transition="in" filter="wheel(1)">
                                       <p:cBhvr>
-                                        <p:cTn id="13" dur="500"/>
+                                        <p:cTn id="15" dur="1000"/>
                                         <p:tgtEl>
-                                          <p:spTgt spid="42"/>
+                                          <p:spTgt spid="15"/>
                                         </p:tgtEl>
                                       </p:cBhvr>
                                     </p:animEffect>
@@ -18898,20 +18916,20 @@
                                 </p:cTn>
                               </p:par>
                               <p:par>
-                                <p:cTn id="14" presetID="21" presetClass="entr" presetSubtype="1" fill="hold" nodeType="withEffect">
+                                <p:cTn id="16" presetID="21" presetClass="entr" presetSubtype="1" fill="hold" nodeType="withEffect">
                                   <p:stCondLst>
                                     <p:cond delay="0"/>
                                   </p:stCondLst>
                                   <p:childTnLst>
                                     <p:set>
                                       <p:cBhvr>
-                                        <p:cTn id="15" dur="1" fill="hold">
+                                        <p:cTn id="17" dur="1" fill="hold">
                                           <p:stCondLst>
                                             <p:cond delay="0"/>
                                           </p:stCondLst>
                                         </p:cTn>
                                         <p:tgtEl>
-                                          <p:spTgt spid="45"/>
+                                          <p:spTgt spid="18"/>
                                         </p:tgtEl>
                                         <p:attrNameLst>
                                           <p:attrName>style.visibility</p:attrName>
@@ -18923,9 +18941,9 @@
                                     </p:set>
                                     <p:animEffect transition="in" filter="wheel(1)">
                                       <p:cBhvr>
-                                        <p:cTn id="16" dur="500"/>
+                                        <p:cTn id="18" dur="1000"/>
                                         <p:tgtEl>
-                                          <p:spTgt spid="45"/>
+                                          <p:spTgt spid="18"/>
                                         </p:tgtEl>
                                       </p:cBhvr>
                                     </p:animEffect>
@@ -18933,20 +18951,20 @@
                                 </p:cTn>
                               </p:par>
                               <p:par>
-                                <p:cTn id="17" presetID="21" presetClass="entr" presetSubtype="1" fill="hold" grpId="0" nodeType="withEffect">
+                                <p:cTn id="19" presetID="21" presetClass="entr" presetSubtype="1" fill="hold" grpId="0" nodeType="withEffect">
                                   <p:stCondLst>
                                     <p:cond delay="0"/>
                                   </p:stCondLst>
                                   <p:childTnLst>
                                     <p:set>
                                       <p:cBhvr>
-                                        <p:cTn id="18" dur="1" fill="hold">
+                                        <p:cTn id="20" dur="1" fill="hold">
                                           <p:stCondLst>
                                             <p:cond delay="0"/>
                                           </p:stCondLst>
                                         </p:cTn>
                                         <p:tgtEl>
-                                          <p:spTgt spid="44"/>
+                                          <p:spTgt spid="17"/>
                                         </p:tgtEl>
                                         <p:attrNameLst>
                                           <p:attrName>style.visibility</p:attrName>
@@ -18958,9 +18976,9 @@
                                     </p:set>
                                     <p:animEffect transition="in" filter="wheel(1)">
                                       <p:cBhvr>
-                                        <p:cTn id="19" dur="500"/>
+                                        <p:cTn id="21" dur="1000"/>
                                         <p:tgtEl>
-                                          <p:spTgt spid="44"/>
+                                          <p:spTgt spid="17"/>
                                         </p:tgtEl>
                                       </p:cBhvr>
                                     </p:animEffect>
@@ -18968,20 +18986,20 @@
                                 </p:cTn>
                               </p:par>
                               <p:par>
-                                <p:cTn id="20" presetID="21" presetClass="entr" presetSubtype="1" fill="hold" nodeType="withEffect">
+                                <p:cTn id="22" presetID="21" presetClass="entr" presetSubtype="1" fill="hold" nodeType="withEffect">
                                   <p:stCondLst>
                                     <p:cond delay="0"/>
                                   </p:stCondLst>
                                   <p:childTnLst>
                                     <p:set>
                                       <p:cBhvr>
-                                        <p:cTn id="21" dur="1" fill="hold">
+                                        <p:cTn id="23" dur="1" fill="hold">
                                           <p:stCondLst>
                                             <p:cond delay="0"/>
                                           </p:stCondLst>
                                         </p:cTn>
                                         <p:tgtEl>
-                                          <p:spTgt spid="43"/>
+                                          <p:spTgt spid="16"/>
                                         </p:tgtEl>
                                         <p:attrNameLst>
                                           <p:attrName>style.visibility</p:attrName>
@@ -18993,9 +19011,9 @@
                                     </p:set>
                                     <p:animEffect transition="in" filter="wheel(1)">
                                       <p:cBhvr>
-                                        <p:cTn id="22" dur="500"/>
+                                        <p:cTn id="24" dur="1000"/>
                                         <p:tgtEl>
-                                          <p:spTgt spid="43"/>
+                                          <p:spTgt spid="16"/>
                                         </p:tgtEl>
                                       </p:cBhvr>
                                     </p:animEffect>
@@ -19003,20 +19021,20 @@
                                 </p:cTn>
                               </p:par>
                               <p:par>
-                                <p:cTn id="23" presetID="21" presetClass="entr" presetSubtype="1" fill="hold" grpId="0" nodeType="withEffect">
+                                <p:cTn id="25" presetID="21" presetClass="entr" presetSubtype="1" fill="hold" grpId="0" nodeType="withEffect">
                                   <p:stCondLst>
                                     <p:cond delay="0"/>
                                   </p:stCondLst>
                                   <p:childTnLst>
                                     <p:set>
                                       <p:cBhvr>
-                                        <p:cTn id="24" dur="1" fill="hold">
+                                        <p:cTn id="26" dur="1" fill="hold">
                                           <p:stCondLst>
                                             <p:cond delay="0"/>
                                           </p:stCondLst>
                                         </p:cTn>
                                         <p:tgtEl>
-                                          <p:spTgt spid="46"/>
+                                          <p:spTgt spid="19"/>
                                         </p:tgtEl>
                                         <p:attrNameLst>
                                           <p:attrName>style.visibility</p:attrName>
@@ -19028,9 +19046,9 @@
                                     </p:set>
                                     <p:animEffect transition="in" filter="wheel(1)">
                                       <p:cBhvr>
-                                        <p:cTn id="25" dur="500"/>
+                                        <p:cTn id="27" dur="1000"/>
                                         <p:tgtEl>
-                                          <p:spTgt spid="46"/>
+                                          <p:spTgt spid="19"/>
                                         </p:tgtEl>
                                       </p:cBhvr>
                                     </p:animEffect>
@@ -19038,20 +19056,20 @@
                                 </p:cTn>
                               </p:par>
                               <p:par>
-                                <p:cTn id="26" presetID="21" presetClass="entr" presetSubtype="1" fill="hold" nodeType="withEffect">
+                                <p:cTn id="28" presetID="21" presetClass="entr" presetSubtype="1" fill="hold" nodeType="withEffect">
                                   <p:stCondLst>
                                     <p:cond delay="0"/>
                                   </p:stCondLst>
                                   <p:childTnLst>
                                     <p:set>
                                       <p:cBhvr>
-                                        <p:cTn id="27" dur="1" fill="hold">
+                                        <p:cTn id="29" dur="1" fill="hold">
                                           <p:stCondLst>
                                             <p:cond delay="0"/>
                                           </p:stCondLst>
                                         </p:cTn>
                                         <p:tgtEl>
-                                          <p:spTgt spid="48"/>
+                                          <p:spTgt spid="21"/>
                                         </p:tgtEl>
                                         <p:attrNameLst>
                                           <p:attrName>style.visibility</p:attrName>
@@ -19063,9 +19081,9 @@
                                     </p:set>
                                     <p:animEffect transition="in" filter="wheel(1)">
                                       <p:cBhvr>
-                                        <p:cTn id="28" dur="500"/>
+                                        <p:cTn id="30" dur="1000"/>
                                         <p:tgtEl>
-                                          <p:spTgt spid="48"/>
+                                          <p:spTgt spid="21"/>
                                         </p:tgtEl>
                                       </p:cBhvr>
                                     </p:animEffect>
@@ -19073,20 +19091,20 @@
                                 </p:cTn>
                               </p:par>
                               <p:par>
-                                <p:cTn id="29" presetID="21" presetClass="entr" presetSubtype="1" fill="hold" grpId="0" nodeType="withEffect">
+                                <p:cTn id="31" presetID="21" presetClass="entr" presetSubtype="1" fill="hold" grpId="0" nodeType="withEffect">
                                   <p:stCondLst>
                                     <p:cond delay="0"/>
                                   </p:stCondLst>
                                   <p:childTnLst>
                                     <p:set>
                                       <p:cBhvr>
-                                        <p:cTn id="30" dur="1" fill="hold">
+                                        <p:cTn id="32" dur="1" fill="hold">
                                           <p:stCondLst>
                                             <p:cond delay="0"/>
                                           </p:stCondLst>
                                         </p:cTn>
                                         <p:tgtEl>
-                                          <p:spTgt spid="47"/>
+                                          <p:spTgt spid="20"/>
                                         </p:tgtEl>
                                         <p:attrNameLst>
                                           <p:attrName>style.visibility</p:attrName>
@@ -19098,9 +19116,9 @@
                                     </p:set>
                                     <p:animEffect transition="in" filter="wheel(1)">
                                       <p:cBhvr>
-                                        <p:cTn id="31" dur="500"/>
+                                        <p:cTn id="33" dur="1000"/>
                                         <p:tgtEl>
-                                          <p:spTgt spid="47"/>
+                                          <p:spTgt spid="20"/>
                                         </p:tgtEl>
                                       </p:cBhvr>
                                     </p:animEffect>
@@ -19108,20 +19126,20 @@
                                 </p:cTn>
                               </p:par>
                               <p:par>
-                                <p:cTn id="32" presetID="21" presetClass="entr" presetSubtype="1" fill="hold" nodeType="withEffect">
+                                <p:cTn id="34" presetID="21" presetClass="entr" presetSubtype="1" fill="hold" nodeType="withEffect">
                                   <p:stCondLst>
                                     <p:cond delay="0"/>
                                   </p:stCondLst>
                                   <p:childTnLst>
                                     <p:set>
                                       <p:cBhvr>
-                                        <p:cTn id="33" dur="1" fill="hold">
+                                        <p:cTn id="35" dur="1" fill="hold">
                                           <p:stCondLst>
                                             <p:cond delay="0"/>
                                           </p:stCondLst>
                                         </p:cTn>
                                         <p:tgtEl>
-                                          <p:spTgt spid="49"/>
+                                          <p:spTgt spid="22"/>
                                         </p:tgtEl>
                                         <p:attrNameLst>
                                           <p:attrName>style.visibility</p:attrName>
@@ -19133,9 +19151,9 @@
                                     </p:set>
                                     <p:animEffect transition="in" filter="wheel(1)">
                                       <p:cBhvr>
-                                        <p:cTn id="34" dur="500"/>
+                                        <p:cTn id="36" dur="1000"/>
                                         <p:tgtEl>
-                                          <p:spTgt spid="49"/>
+                                          <p:spTgt spid="22"/>
                                         </p:tgtEl>
                                       </p:cBhvr>
                                     </p:animEffect>
@@ -19143,20 +19161,20 @@
                                 </p:cTn>
                               </p:par>
                               <p:par>
-                                <p:cTn id="35" presetID="21" presetClass="entr" presetSubtype="1" fill="hold" grpId="0" nodeType="withEffect">
+                                <p:cTn id="37" presetID="21" presetClass="entr" presetSubtype="1" fill="hold" grpId="0" nodeType="withEffect">
                                   <p:stCondLst>
                                     <p:cond delay="0"/>
                                   </p:stCondLst>
                                   <p:childTnLst>
                                     <p:set>
                                       <p:cBhvr>
-                                        <p:cTn id="36" dur="1" fill="hold">
+                                        <p:cTn id="38" dur="1" fill="hold">
                                           <p:stCondLst>
                                             <p:cond delay="0"/>
                                           </p:stCondLst>
                                         </p:cTn>
                                         <p:tgtEl>
-                                          <p:spTgt spid="50"/>
+                                          <p:spTgt spid="23"/>
                                         </p:tgtEl>
                                         <p:attrNameLst>
                                           <p:attrName>style.visibility</p:attrName>
@@ -19168,9 +19186,9 @@
                                     </p:set>
                                     <p:animEffect transition="in" filter="wheel(1)">
                                       <p:cBhvr>
-                                        <p:cTn id="37" dur="500"/>
+                                        <p:cTn id="39" dur="1000"/>
                                         <p:tgtEl>
-                                          <p:spTgt spid="50"/>
+                                          <p:spTgt spid="23"/>
                                         </p:tgtEl>
                                       </p:cBhvr>
                                     </p:animEffect>
@@ -19206,11 +19224,11 @@
     </p:tnLst>
     <p:bldLst>
       <p:bldP spid="7" grpId="0"/>
-      <p:bldP spid="41" grpId="0"/>
-      <p:bldP spid="44" grpId="0"/>
-      <p:bldP spid="46" grpId="0"/>
-      <p:bldP spid="47" grpId="0"/>
-      <p:bldP spid="50" grpId="0"/>
+      <p:bldP spid="14" grpId="0"/>
+      <p:bldP spid="17" grpId="0"/>
+      <p:bldP spid="19" grpId="0"/>
+      <p:bldP spid="20" grpId="0"/>
+      <p:bldP spid="23" grpId="0"/>
     </p:bldLst>
   </p:timing>
 </p:sld>

</xml_diff>